<commit_message>
added exercises Day 1
</commit_message>
<xml_diff>
--- a/Day1/Day1.pptx
+++ b/Day1/Day1.pptx
@@ -5,7 +5,7 @@
     <p:sldMasterId id="2147483648" r:id="rId1"/>
   </p:sldMasterIdLst>
   <p:notesMasterIdLst>
-    <p:notesMasterId r:id="rId9"/>
+    <p:notesMasterId r:id="rId24"/>
   </p:notesMasterIdLst>
   <p:sldIdLst>
     <p:sldId id="256" r:id="rId2"/>
@@ -15,6 +15,21 @@
     <p:sldId id="260" r:id="rId6"/>
     <p:sldId id="261" r:id="rId7"/>
     <p:sldId id="262" r:id="rId8"/>
+    <p:sldId id="264" r:id="rId9"/>
+    <p:sldId id="263" r:id="rId10"/>
+    <p:sldId id="265" r:id="rId11"/>
+    <p:sldId id="267" r:id="rId12"/>
+    <p:sldId id="268" r:id="rId13"/>
+    <p:sldId id="269" r:id="rId14"/>
+    <p:sldId id="270" r:id="rId15"/>
+    <p:sldId id="271" r:id="rId16"/>
+    <p:sldId id="272" r:id="rId17"/>
+    <p:sldId id="273" r:id="rId18"/>
+    <p:sldId id="274" r:id="rId19"/>
+    <p:sldId id="275" r:id="rId20"/>
+    <p:sldId id="276" r:id="rId21"/>
+    <p:sldId id="277" r:id="rId22"/>
+    <p:sldId id="278" r:id="rId23"/>
   </p:sldIdLst>
   <p:sldSz cx="12192000" cy="6858000"/>
   <p:notesSz cx="6858000" cy="9144000"/>
@@ -3887,6 +3902,2032 @@
 </p:sld>
 </file>
 
+<file path=ppt/slides/slide10.xml><?xml version="1.0" encoding="utf-8"?>
+<p:sld xmlns:a="http://schemas.openxmlformats.org/drawingml/2006/main" xmlns:r="http://schemas.openxmlformats.org/officeDocument/2006/relationships" xmlns:p="http://schemas.openxmlformats.org/presentationml/2006/main">
+  <p:cSld>
+    <p:spTree>
+      <p:nvGrpSpPr>
+        <p:cNvPr id="1" name=""/>
+        <p:cNvGrpSpPr/>
+        <p:nvPr/>
+      </p:nvGrpSpPr>
+      <p:grpSpPr>
+        <a:xfrm>
+          <a:off x="0" y="0"/>
+          <a:ext cx="0" cy="0"/>
+          <a:chOff x="0" y="0"/>
+          <a:chExt cx="0" cy="0"/>
+        </a:xfrm>
+      </p:grpSpPr>
+      <p:sp>
+        <p:nvSpPr>
+          <p:cNvPr id="2" name="Title 1">
+            <a:extLst>
+              <a:ext uri="{FF2B5EF4-FFF2-40B4-BE49-F238E27FC236}">
+                <a16:creationId xmlns:a16="http://schemas.microsoft.com/office/drawing/2014/main" id="{C554AC7F-83F8-7014-61D3-A290E4AFB297}"/>
+              </a:ext>
+            </a:extLst>
+          </p:cNvPr>
+          <p:cNvSpPr>
+            <a:spLocks noGrp="1"/>
+          </p:cNvSpPr>
+          <p:nvPr>
+            <p:ph type="title"/>
+          </p:nvPr>
+        </p:nvSpPr>
+        <p:spPr/>
+        <p:txBody>
+          <a:bodyPr/>
+          <a:lstStyle/>
+          <a:p>
+            <a:r>
+              <a:rPr lang="en-US" b="1" dirty="0">
+                <a:solidFill>
+                  <a:schemeClr val="accent1">
+                    <a:lumMod val="75000"/>
+                  </a:schemeClr>
+                </a:solidFill>
+              </a:rPr>
+              <a:t>Exercise 2: Solution</a:t>
+            </a:r>
+            <a:endParaRPr lang="en-US" dirty="0"/>
+          </a:p>
+        </p:txBody>
+      </p:sp>
+      <p:sp>
+        <p:nvSpPr>
+          <p:cNvPr id="3" name="Content Placeholder 2">
+            <a:extLst>
+              <a:ext uri="{FF2B5EF4-FFF2-40B4-BE49-F238E27FC236}">
+                <a16:creationId xmlns:a16="http://schemas.microsoft.com/office/drawing/2014/main" id="{C525A007-A8EE-CD6D-6800-C06E6CB49CB0}"/>
+              </a:ext>
+            </a:extLst>
+          </p:cNvPr>
+          <p:cNvSpPr>
+            <a:spLocks noGrp="1"/>
+          </p:cNvSpPr>
+          <p:nvPr>
+            <p:ph idx="1"/>
+          </p:nvPr>
+        </p:nvSpPr>
+        <p:spPr/>
+        <p:txBody>
+          <a:bodyPr>
+            <a:normAutofit/>
+          </a:bodyPr>
+          <a:lstStyle/>
+          <a:p>
+            <a:pPr marL="0" indent="0">
+              <a:buNone/>
+            </a:pPr>
+            <a:endParaRPr lang="en-US" dirty="0"/>
+          </a:p>
+          <a:p>
+            <a:pPr marL="0" indent="0">
+              <a:buNone/>
+            </a:pPr>
+            <a:r>
+              <a:rPr lang="en-GB" dirty="0">
+                <a:effectLst/>
+                <a:latin typeface="Menlo" panose="020B0609030804020204" pitchFamily="49" charset="0"/>
+              </a:rPr>
+              <a:t>def </a:t>
+            </a:r>
+            <a:r>
+              <a:rPr lang="en-GB" dirty="0" err="1">
+                <a:effectLst/>
+                <a:latin typeface="Menlo" panose="020B0609030804020204" pitchFamily="49" charset="0"/>
+              </a:rPr>
+              <a:t>taylor_songs</a:t>
+            </a:r>
+            <a:r>
+              <a:rPr lang="en-GB" dirty="0">
+                <a:effectLst/>
+                <a:latin typeface="Menlo" panose="020B0609030804020204" pitchFamily="49" charset="0"/>
+              </a:rPr>
+              <a:t>(ser)</a:t>
+            </a:r>
+          </a:p>
+          <a:p>
+            <a:pPr marL="0" indent="0">
+              <a:buNone/>
+            </a:pPr>
+            <a:r>
+              <a:rPr lang="en-GB" dirty="0">
+                <a:effectLst/>
+                <a:latin typeface="Menlo" panose="020B0609030804020204" pitchFamily="49" charset="0"/>
+              </a:rPr>
+              <a:t>    </a:t>
+            </a:r>
+            <a:r>
+              <a:rPr lang="en-GB" dirty="0" err="1">
+                <a:effectLst/>
+                <a:latin typeface="Menlo" panose="020B0609030804020204" pitchFamily="49" charset="0"/>
+              </a:rPr>
+              <a:t>taylor_list</a:t>
+            </a:r>
+            <a:r>
+              <a:rPr lang="en-GB" dirty="0">
+                <a:effectLst/>
+                <a:latin typeface="Menlo" panose="020B0609030804020204" pitchFamily="49" charset="0"/>
+              </a:rPr>
+              <a:t> = []</a:t>
+            </a:r>
+          </a:p>
+          <a:p>
+            <a:pPr marL="0" indent="0">
+              <a:buNone/>
+            </a:pPr>
+            <a:r>
+              <a:rPr lang="en-GB" dirty="0">
+                <a:effectLst/>
+                <a:latin typeface="Menlo" panose="020B0609030804020204" pitchFamily="49" charset="0"/>
+              </a:rPr>
+              <a:t>    for x in ser:</a:t>
+            </a:r>
+          </a:p>
+          <a:p>
+            <a:pPr marL="0" indent="0">
+              <a:buNone/>
+            </a:pPr>
+            <a:r>
+              <a:rPr lang="en-GB" dirty="0">
+                <a:effectLst/>
+                <a:latin typeface="Menlo" panose="020B0609030804020204" pitchFamily="49" charset="0"/>
+              </a:rPr>
+              <a:t>        </a:t>
+            </a:r>
+            <a:r>
+              <a:rPr lang="en-GB" dirty="0" err="1">
+                <a:effectLst/>
+                <a:latin typeface="Menlo" panose="020B0609030804020204" pitchFamily="49" charset="0"/>
+              </a:rPr>
+              <a:t>taylor.append</a:t>
+            </a:r>
+            <a:r>
+              <a:rPr lang="en-GB" dirty="0">
+                <a:effectLst/>
+                <a:latin typeface="Menlo" panose="020B0609030804020204" pitchFamily="49" charset="0"/>
+              </a:rPr>
+              <a:t>(</a:t>
+            </a:r>
+            <a:r>
+              <a:rPr lang="en-GB" dirty="0" err="1">
+                <a:effectLst/>
+                <a:latin typeface="Menlo" panose="020B0609030804020204" pitchFamily="49" charset="0"/>
+              </a:rPr>
+              <a:t>len</a:t>
+            </a:r>
+            <a:r>
+              <a:rPr lang="en-GB" dirty="0">
+                <a:effectLst/>
+                <a:latin typeface="Menlo" panose="020B0609030804020204" pitchFamily="49" charset="0"/>
+              </a:rPr>
+              <a:t>(x))</a:t>
+            </a:r>
+          </a:p>
+          <a:p>
+            <a:pPr marL="0" indent="0">
+              <a:buNone/>
+            </a:pPr>
+            <a:r>
+              <a:rPr lang="en-GB" dirty="0">
+                <a:effectLst/>
+                <a:latin typeface="Menlo" panose="020B0609030804020204" pitchFamily="49" charset="0"/>
+              </a:rPr>
+              <a:t>    print(</a:t>
+            </a:r>
+            <a:r>
+              <a:rPr lang="en-GB" dirty="0" err="1">
+                <a:effectLst/>
+                <a:latin typeface="Menlo" panose="020B0609030804020204" pitchFamily="49" charset="0"/>
+              </a:rPr>
+              <a:t>pd.Series</a:t>
+            </a:r>
+            <a:r>
+              <a:rPr lang="en-GB" dirty="0">
+                <a:effectLst/>
+                <a:latin typeface="Menlo" panose="020B0609030804020204" pitchFamily="49" charset="0"/>
+              </a:rPr>
+              <a:t>(</a:t>
+            </a:r>
+            <a:r>
+              <a:rPr lang="en-GB" dirty="0" err="1">
+                <a:effectLst/>
+                <a:latin typeface="Menlo" panose="020B0609030804020204" pitchFamily="49" charset="0"/>
+              </a:rPr>
+              <a:t>taylor_list</a:t>
+            </a:r>
+            <a:r>
+              <a:rPr lang="en-GB" dirty="0">
+                <a:effectLst/>
+                <a:latin typeface="Menlo" panose="020B0609030804020204" pitchFamily="49" charset="0"/>
+              </a:rPr>
+              <a:t>))</a:t>
+            </a:r>
+          </a:p>
+          <a:p>
+            <a:pPr marL="0" indent="0">
+              <a:buNone/>
+            </a:pPr>
+            <a:r>
+              <a:rPr lang="en-US" dirty="0">
+                <a:effectLst/>
+                <a:latin typeface="Menlo" panose="020B0609030804020204" pitchFamily="49" charset="0"/>
+              </a:rPr>
+              <a:t>    </a:t>
+            </a:r>
+            <a:r>
+              <a:rPr lang="en-GB" dirty="0">
+                <a:effectLst/>
+                <a:latin typeface="Menlo" panose="020B0609030804020204" pitchFamily="49" charset="0"/>
+              </a:rPr>
+              <a:t>print(max(</a:t>
+            </a:r>
+            <a:r>
+              <a:rPr lang="en-GB" dirty="0" err="1">
+                <a:effectLst/>
+                <a:latin typeface="Menlo" panose="020B0609030804020204" pitchFamily="49" charset="0"/>
+              </a:rPr>
+              <a:t>taylor_list</a:t>
+            </a:r>
+            <a:r>
+              <a:rPr lang="en-GB" dirty="0">
+                <a:effectLst/>
+                <a:latin typeface="Menlo" panose="020B0609030804020204" pitchFamily="49" charset="0"/>
+              </a:rPr>
+              <a:t>))</a:t>
+            </a:r>
+            <a:endParaRPr lang="en-US" dirty="0"/>
+          </a:p>
+        </p:txBody>
+      </p:sp>
+      <p:sp>
+        <p:nvSpPr>
+          <p:cNvPr id="4" name="Slide Number Placeholder 3">
+            <a:extLst>
+              <a:ext uri="{FF2B5EF4-FFF2-40B4-BE49-F238E27FC236}">
+                <a16:creationId xmlns:a16="http://schemas.microsoft.com/office/drawing/2014/main" id="{536DC667-8273-C810-1058-FB32AFE64120}"/>
+              </a:ext>
+            </a:extLst>
+          </p:cNvPr>
+          <p:cNvSpPr>
+            <a:spLocks noGrp="1"/>
+          </p:cNvSpPr>
+          <p:nvPr>
+            <p:ph type="sldNum" sz="quarter" idx="12"/>
+          </p:nvPr>
+        </p:nvSpPr>
+        <p:spPr/>
+        <p:txBody>
+          <a:bodyPr/>
+          <a:lstStyle/>
+          <a:p>
+            <a:fld id="{491CF4B3-B97C-1B49-985A-93725184CD23}" type="slidenum">
+              <a:rPr lang="en-US" smtClean="0"/>
+              <a:t>10</a:t>
+            </a:fld>
+            <a:endParaRPr lang="en-US"/>
+          </a:p>
+        </p:txBody>
+      </p:sp>
+    </p:spTree>
+    <p:extLst>
+      <p:ext uri="{BB962C8B-B14F-4D97-AF65-F5344CB8AC3E}">
+        <p14:creationId xmlns:p14="http://schemas.microsoft.com/office/powerpoint/2010/main" val="385179709"/>
+      </p:ext>
+    </p:extLst>
+  </p:cSld>
+  <p:clrMapOvr>
+    <a:masterClrMapping/>
+  </p:clrMapOvr>
+</p:sld>
+</file>
+
+<file path=ppt/slides/slide11.xml><?xml version="1.0" encoding="utf-8"?>
+<p:sld xmlns:a="http://schemas.openxmlformats.org/drawingml/2006/main" xmlns:r="http://schemas.openxmlformats.org/officeDocument/2006/relationships" xmlns:p="http://schemas.openxmlformats.org/presentationml/2006/main">
+  <p:cSld>
+    <p:spTree>
+      <p:nvGrpSpPr>
+        <p:cNvPr id="1" name=""/>
+        <p:cNvGrpSpPr/>
+        <p:nvPr/>
+      </p:nvGrpSpPr>
+      <p:grpSpPr>
+        <a:xfrm>
+          <a:off x="0" y="0"/>
+          <a:ext cx="0" cy="0"/>
+          <a:chOff x="0" y="0"/>
+          <a:chExt cx="0" cy="0"/>
+        </a:xfrm>
+      </p:grpSpPr>
+      <p:sp>
+        <p:nvSpPr>
+          <p:cNvPr id="2" name="Title 1">
+            <a:extLst>
+              <a:ext uri="{FF2B5EF4-FFF2-40B4-BE49-F238E27FC236}">
+                <a16:creationId xmlns:a16="http://schemas.microsoft.com/office/drawing/2014/main" id="{77F1C72F-3D40-8EAD-F261-CFAB0E5611C1}"/>
+              </a:ext>
+            </a:extLst>
+          </p:cNvPr>
+          <p:cNvSpPr>
+            <a:spLocks noGrp="1"/>
+          </p:cNvSpPr>
+          <p:nvPr>
+            <p:ph type="title"/>
+          </p:nvPr>
+        </p:nvSpPr>
+        <p:spPr/>
+        <p:txBody>
+          <a:bodyPr/>
+          <a:lstStyle/>
+          <a:p>
+            <a:r>
+              <a:rPr lang="en-US" b="1" dirty="0">
+                <a:solidFill>
+                  <a:schemeClr val="accent1">
+                    <a:lumMod val="75000"/>
+                  </a:schemeClr>
+                </a:solidFill>
+              </a:rPr>
+              <a:t>Exercise 3: Taylor Swift Songs</a:t>
+            </a:r>
+            <a:r>
+              <a:rPr lang="en-US" dirty="0"/>
+              <a:t>⭐️ ⭐️</a:t>
+            </a:r>
+          </a:p>
+        </p:txBody>
+      </p:sp>
+      <p:sp>
+        <p:nvSpPr>
+          <p:cNvPr id="3" name="Content Placeholder 2">
+            <a:extLst>
+              <a:ext uri="{FF2B5EF4-FFF2-40B4-BE49-F238E27FC236}">
+                <a16:creationId xmlns:a16="http://schemas.microsoft.com/office/drawing/2014/main" id="{DD5FB579-A0E3-9131-FDE0-9923615C1FF9}"/>
+              </a:ext>
+            </a:extLst>
+          </p:cNvPr>
+          <p:cNvSpPr>
+            <a:spLocks noGrp="1"/>
+          </p:cNvSpPr>
+          <p:nvPr>
+            <p:ph idx="1"/>
+          </p:nvPr>
+        </p:nvSpPr>
+        <p:spPr/>
+        <p:txBody>
+          <a:bodyPr>
+            <a:normAutofit lnSpcReduction="10000"/>
+          </a:bodyPr>
+          <a:lstStyle/>
+          <a:p>
+            <a:pPr marL="0" indent="0">
+              <a:buNone/>
+            </a:pPr>
+            <a:r>
+              <a:rPr lang="en-US" dirty="0"/>
+              <a:t>Write a function that goes through each one of Taylor’s songs and prints the names of all the ones which have higher than average popularity.</a:t>
+            </a:r>
+          </a:p>
+          <a:p>
+            <a:pPr marL="0" indent="0">
+              <a:buNone/>
+            </a:pPr>
+            <a:endParaRPr lang="en-US" dirty="0"/>
+          </a:p>
+          <a:p>
+            <a:pPr marL="0" indent="0">
+              <a:buNone/>
+            </a:pPr>
+            <a:r>
+              <a:rPr lang="en-US" dirty="0"/>
+              <a:t>Input</a:t>
+            </a:r>
+          </a:p>
+          <a:p>
+            <a:pPr marL="0" indent="0">
+              <a:buNone/>
+            </a:pPr>
+            <a:r>
+              <a:rPr lang="en-US" dirty="0"/>
+              <a:t>ser = </a:t>
+            </a:r>
+            <a:r>
+              <a:rPr lang="en-US" dirty="0" err="1"/>
+              <a:t>pd.Series</a:t>
+            </a:r>
+            <a:r>
+              <a:rPr lang="en-US" dirty="0"/>
+              <a:t>(['Clean', 'All Too Well', 'Lover', 'Ivy’])</a:t>
+            </a:r>
+          </a:p>
+          <a:p>
+            <a:pPr marL="0" indent="0">
+              <a:buNone/>
+            </a:pPr>
+            <a:r>
+              <a:rPr lang="en-US" dirty="0"/>
+              <a:t>popularity = </a:t>
+            </a:r>
+            <a:r>
+              <a:rPr lang="en-US" dirty="0" err="1"/>
+              <a:t>pd.Series</a:t>
+            </a:r>
+            <a:r>
+              <a:rPr lang="en-US" dirty="0"/>
+              <a:t>([0.2, 0.6, 0.8, 0.4])</a:t>
+            </a:r>
+            <a:br>
+              <a:rPr lang="en-US" dirty="0"/>
+            </a:br>
+            <a:endParaRPr lang="en-US" dirty="0"/>
+          </a:p>
+          <a:p>
+            <a:pPr marL="0" indent="0">
+              <a:buNone/>
+            </a:pPr>
+            <a:r>
+              <a:rPr lang="en-US" dirty="0"/>
+              <a:t>Desired output</a:t>
+            </a:r>
+          </a:p>
+          <a:p>
+            <a:pPr marL="0" indent="0">
+              <a:buNone/>
+            </a:pPr>
+            <a:r>
+              <a:rPr lang="en-US" dirty="0"/>
+              <a:t>All Too Well, Lover</a:t>
+            </a:r>
+          </a:p>
+          <a:p>
+            <a:pPr marL="0" indent="0">
+              <a:buNone/>
+            </a:pPr>
+            <a:endParaRPr lang="en-US" dirty="0"/>
+          </a:p>
+          <a:p>
+            <a:endParaRPr lang="en-US" dirty="0"/>
+          </a:p>
+        </p:txBody>
+      </p:sp>
+      <p:sp>
+        <p:nvSpPr>
+          <p:cNvPr id="4" name="Slide Number Placeholder 3">
+            <a:extLst>
+              <a:ext uri="{FF2B5EF4-FFF2-40B4-BE49-F238E27FC236}">
+                <a16:creationId xmlns:a16="http://schemas.microsoft.com/office/drawing/2014/main" id="{AE79DCC1-E911-24A4-1197-782092FF1E2E}"/>
+              </a:ext>
+            </a:extLst>
+          </p:cNvPr>
+          <p:cNvSpPr>
+            <a:spLocks noGrp="1"/>
+          </p:cNvSpPr>
+          <p:nvPr>
+            <p:ph type="sldNum" sz="quarter" idx="12"/>
+          </p:nvPr>
+        </p:nvSpPr>
+        <p:spPr/>
+        <p:txBody>
+          <a:bodyPr/>
+          <a:lstStyle/>
+          <a:p>
+            <a:fld id="{491CF4B3-B97C-1B49-985A-93725184CD23}" type="slidenum">
+              <a:rPr lang="en-US" smtClean="0"/>
+              <a:t>11</a:t>
+            </a:fld>
+            <a:endParaRPr lang="en-US"/>
+          </a:p>
+        </p:txBody>
+      </p:sp>
+    </p:spTree>
+    <p:extLst>
+      <p:ext uri="{BB962C8B-B14F-4D97-AF65-F5344CB8AC3E}">
+        <p14:creationId xmlns:p14="http://schemas.microsoft.com/office/powerpoint/2010/main" val="4020040495"/>
+      </p:ext>
+    </p:extLst>
+  </p:cSld>
+  <p:clrMapOvr>
+    <a:masterClrMapping/>
+  </p:clrMapOvr>
+</p:sld>
+</file>
+
+<file path=ppt/slides/slide12.xml><?xml version="1.0" encoding="utf-8"?>
+<p:sld xmlns:a="http://schemas.openxmlformats.org/drawingml/2006/main" xmlns:r="http://schemas.openxmlformats.org/officeDocument/2006/relationships" xmlns:p="http://schemas.openxmlformats.org/presentationml/2006/main">
+  <p:cSld>
+    <p:spTree>
+      <p:nvGrpSpPr>
+        <p:cNvPr id="1" name=""/>
+        <p:cNvGrpSpPr/>
+        <p:nvPr/>
+      </p:nvGrpSpPr>
+      <p:grpSpPr>
+        <a:xfrm>
+          <a:off x="0" y="0"/>
+          <a:ext cx="0" cy="0"/>
+          <a:chOff x="0" y="0"/>
+          <a:chExt cx="0" cy="0"/>
+        </a:xfrm>
+      </p:grpSpPr>
+      <p:sp>
+        <p:nvSpPr>
+          <p:cNvPr id="2" name="Title 1">
+            <a:extLst>
+              <a:ext uri="{FF2B5EF4-FFF2-40B4-BE49-F238E27FC236}">
+                <a16:creationId xmlns:a16="http://schemas.microsoft.com/office/drawing/2014/main" id="{C554AC7F-83F8-7014-61D3-A290E4AFB297}"/>
+              </a:ext>
+            </a:extLst>
+          </p:cNvPr>
+          <p:cNvSpPr>
+            <a:spLocks noGrp="1"/>
+          </p:cNvSpPr>
+          <p:nvPr>
+            <p:ph type="title"/>
+          </p:nvPr>
+        </p:nvSpPr>
+        <p:spPr/>
+        <p:txBody>
+          <a:bodyPr/>
+          <a:lstStyle/>
+          <a:p>
+            <a:r>
+              <a:rPr lang="en-US" b="1" dirty="0">
+                <a:solidFill>
+                  <a:schemeClr val="accent1">
+                    <a:lumMod val="75000"/>
+                  </a:schemeClr>
+                </a:solidFill>
+              </a:rPr>
+              <a:t>Exercise 3: Solution</a:t>
+            </a:r>
+            <a:endParaRPr lang="en-US" dirty="0"/>
+          </a:p>
+        </p:txBody>
+      </p:sp>
+      <p:sp>
+        <p:nvSpPr>
+          <p:cNvPr id="3" name="Content Placeholder 2">
+            <a:extLst>
+              <a:ext uri="{FF2B5EF4-FFF2-40B4-BE49-F238E27FC236}">
+                <a16:creationId xmlns:a16="http://schemas.microsoft.com/office/drawing/2014/main" id="{C525A007-A8EE-CD6D-6800-C06E6CB49CB0}"/>
+              </a:ext>
+            </a:extLst>
+          </p:cNvPr>
+          <p:cNvSpPr>
+            <a:spLocks noGrp="1"/>
+          </p:cNvSpPr>
+          <p:nvPr>
+            <p:ph idx="1"/>
+          </p:nvPr>
+        </p:nvSpPr>
+        <p:spPr/>
+        <p:txBody>
+          <a:bodyPr>
+            <a:normAutofit/>
+          </a:bodyPr>
+          <a:lstStyle/>
+          <a:p>
+            <a:pPr marL="0" indent="0">
+              <a:buNone/>
+            </a:pPr>
+            <a:endParaRPr lang="en-US" dirty="0"/>
+          </a:p>
+        </p:txBody>
+      </p:sp>
+      <p:sp>
+        <p:nvSpPr>
+          <p:cNvPr id="4" name="Slide Number Placeholder 3">
+            <a:extLst>
+              <a:ext uri="{FF2B5EF4-FFF2-40B4-BE49-F238E27FC236}">
+                <a16:creationId xmlns:a16="http://schemas.microsoft.com/office/drawing/2014/main" id="{536DC667-8273-C810-1058-FB32AFE64120}"/>
+              </a:ext>
+            </a:extLst>
+          </p:cNvPr>
+          <p:cNvSpPr>
+            <a:spLocks noGrp="1"/>
+          </p:cNvSpPr>
+          <p:nvPr>
+            <p:ph type="sldNum" sz="quarter" idx="12"/>
+          </p:nvPr>
+        </p:nvSpPr>
+        <p:spPr/>
+        <p:txBody>
+          <a:bodyPr/>
+          <a:lstStyle/>
+          <a:p>
+            <a:fld id="{491CF4B3-B97C-1B49-985A-93725184CD23}" type="slidenum">
+              <a:rPr lang="en-US" smtClean="0"/>
+              <a:t>12</a:t>
+            </a:fld>
+            <a:endParaRPr lang="en-US"/>
+          </a:p>
+        </p:txBody>
+      </p:sp>
+    </p:spTree>
+    <p:extLst>
+      <p:ext uri="{BB962C8B-B14F-4D97-AF65-F5344CB8AC3E}">
+        <p14:creationId xmlns:p14="http://schemas.microsoft.com/office/powerpoint/2010/main" val="966384035"/>
+      </p:ext>
+    </p:extLst>
+  </p:cSld>
+  <p:clrMapOvr>
+    <a:masterClrMapping/>
+  </p:clrMapOvr>
+</p:sld>
+</file>
+
+<file path=ppt/slides/slide13.xml><?xml version="1.0" encoding="utf-8"?>
+<p:sld xmlns:a="http://schemas.openxmlformats.org/drawingml/2006/main" xmlns:r="http://schemas.openxmlformats.org/officeDocument/2006/relationships" xmlns:p="http://schemas.openxmlformats.org/presentationml/2006/main">
+  <p:cSld>
+    <p:spTree>
+      <p:nvGrpSpPr>
+        <p:cNvPr id="1" name=""/>
+        <p:cNvGrpSpPr/>
+        <p:nvPr/>
+      </p:nvGrpSpPr>
+      <p:grpSpPr>
+        <a:xfrm>
+          <a:off x="0" y="0"/>
+          <a:ext cx="0" cy="0"/>
+          <a:chOff x="0" y="0"/>
+          <a:chExt cx="0" cy="0"/>
+        </a:xfrm>
+      </p:grpSpPr>
+      <p:sp>
+        <p:nvSpPr>
+          <p:cNvPr id="2" name="Title 1">
+            <a:extLst>
+              <a:ext uri="{FF2B5EF4-FFF2-40B4-BE49-F238E27FC236}">
+                <a16:creationId xmlns:a16="http://schemas.microsoft.com/office/drawing/2014/main" id="{77F1C72F-3D40-8EAD-F261-CFAB0E5611C1}"/>
+              </a:ext>
+            </a:extLst>
+          </p:cNvPr>
+          <p:cNvSpPr>
+            <a:spLocks noGrp="1"/>
+          </p:cNvSpPr>
+          <p:nvPr>
+            <p:ph type="title"/>
+          </p:nvPr>
+        </p:nvSpPr>
+        <p:spPr/>
+        <p:txBody>
+          <a:bodyPr/>
+          <a:lstStyle/>
+          <a:p>
+            <a:r>
+              <a:rPr lang="en-US" b="1" dirty="0">
+                <a:solidFill>
+                  <a:schemeClr val="accent1">
+                    <a:lumMod val="75000"/>
+                  </a:schemeClr>
+                </a:solidFill>
+              </a:rPr>
+              <a:t>Exercise 4: Find the Vowels</a:t>
+            </a:r>
+            <a:r>
+              <a:rPr lang="en-US" dirty="0"/>
+              <a:t>⭐️ ⭐️</a:t>
+            </a:r>
+          </a:p>
+        </p:txBody>
+      </p:sp>
+      <p:sp>
+        <p:nvSpPr>
+          <p:cNvPr id="3" name="Content Placeholder 2">
+            <a:extLst>
+              <a:ext uri="{FF2B5EF4-FFF2-40B4-BE49-F238E27FC236}">
+                <a16:creationId xmlns:a16="http://schemas.microsoft.com/office/drawing/2014/main" id="{DD5FB579-A0E3-9131-FDE0-9923615C1FF9}"/>
+              </a:ext>
+            </a:extLst>
+          </p:cNvPr>
+          <p:cNvSpPr>
+            <a:spLocks noGrp="1"/>
+          </p:cNvSpPr>
+          <p:nvPr>
+            <p:ph idx="1"/>
+          </p:nvPr>
+        </p:nvSpPr>
+        <p:spPr/>
+        <p:txBody>
+          <a:bodyPr>
+            <a:normAutofit/>
+          </a:bodyPr>
+          <a:lstStyle/>
+          <a:p>
+            <a:pPr marL="0" indent="0">
+              <a:buNone/>
+            </a:pPr>
+            <a:r>
+              <a:rPr lang="en-US" dirty="0"/>
+              <a:t>Write a function that prints the words that contain at least 2 vowels from a series.</a:t>
+            </a:r>
+            <a:br>
+              <a:rPr lang="en-US" dirty="0"/>
+            </a:br>
+            <a:endParaRPr lang="en-US" dirty="0"/>
+          </a:p>
+          <a:p>
+            <a:pPr marL="0" indent="0">
+              <a:buNone/>
+            </a:pPr>
+            <a:r>
+              <a:rPr lang="en-US" dirty="0"/>
+              <a:t>ser = </a:t>
+            </a:r>
+            <a:r>
+              <a:rPr lang="en-US" dirty="0" err="1"/>
+              <a:t>pd.Series</a:t>
+            </a:r>
+            <a:r>
+              <a:rPr lang="en-US" dirty="0"/>
+              <a:t>(['Apple', 'Orange', 'Plan', 'Python', 'Money'])</a:t>
+            </a:r>
+            <a:br>
+              <a:rPr lang="en-US" dirty="0"/>
+            </a:br>
+            <a:endParaRPr lang="en-US" dirty="0"/>
+          </a:p>
+          <a:p>
+            <a:pPr marL="0" indent="0">
+              <a:buNone/>
+            </a:pPr>
+            <a:r>
+              <a:rPr lang="en-US" dirty="0"/>
+              <a:t>Desired output</a:t>
+            </a:r>
+          </a:p>
+          <a:p>
+            <a:pPr marL="0" indent="0">
+              <a:buNone/>
+            </a:pPr>
+            <a:endParaRPr lang="en-US" dirty="0"/>
+          </a:p>
+          <a:p>
+            <a:pPr marL="0" indent="0">
+              <a:buNone/>
+            </a:pPr>
+            <a:r>
+              <a:rPr lang="en-US" dirty="0"/>
+              <a:t>Apple, Orange, Money</a:t>
+            </a:r>
+          </a:p>
+          <a:p>
+            <a:endParaRPr lang="en-US" dirty="0"/>
+          </a:p>
+        </p:txBody>
+      </p:sp>
+      <p:sp>
+        <p:nvSpPr>
+          <p:cNvPr id="4" name="Slide Number Placeholder 3">
+            <a:extLst>
+              <a:ext uri="{FF2B5EF4-FFF2-40B4-BE49-F238E27FC236}">
+                <a16:creationId xmlns:a16="http://schemas.microsoft.com/office/drawing/2014/main" id="{AE79DCC1-E911-24A4-1197-782092FF1E2E}"/>
+              </a:ext>
+            </a:extLst>
+          </p:cNvPr>
+          <p:cNvSpPr>
+            <a:spLocks noGrp="1"/>
+          </p:cNvSpPr>
+          <p:nvPr>
+            <p:ph type="sldNum" sz="quarter" idx="12"/>
+          </p:nvPr>
+        </p:nvSpPr>
+        <p:spPr/>
+        <p:txBody>
+          <a:bodyPr/>
+          <a:lstStyle/>
+          <a:p>
+            <a:fld id="{491CF4B3-B97C-1B49-985A-93725184CD23}" type="slidenum">
+              <a:rPr lang="en-US" smtClean="0"/>
+              <a:t>13</a:t>
+            </a:fld>
+            <a:endParaRPr lang="en-US"/>
+          </a:p>
+        </p:txBody>
+      </p:sp>
+    </p:spTree>
+    <p:extLst>
+      <p:ext uri="{BB962C8B-B14F-4D97-AF65-F5344CB8AC3E}">
+        <p14:creationId xmlns:p14="http://schemas.microsoft.com/office/powerpoint/2010/main" val="3336692508"/>
+      </p:ext>
+    </p:extLst>
+  </p:cSld>
+  <p:clrMapOvr>
+    <a:masterClrMapping/>
+  </p:clrMapOvr>
+</p:sld>
+</file>
+
+<file path=ppt/slides/slide14.xml><?xml version="1.0" encoding="utf-8"?>
+<p:sld xmlns:a="http://schemas.openxmlformats.org/drawingml/2006/main" xmlns:r="http://schemas.openxmlformats.org/officeDocument/2006/relationships" xmlns:p="http://schemas.openxmlformats.org/presentationml/2006/main">
+  <p:cSld>
+    <p:spTree>
+      <p:nvGrpSpPr>
+        <p:cNvPr id="1" name=""/>
+        <p:cNvGrpSpPr/>
+        <p:nvPr/>
+      </p:nvGrpSpPr>
+      <p:grpSpPr>
+        <a:xfrm>
+          <a:off x="0" y="0"/>
+          <a:ext cx="0" cy="0"/>
+          <a:chOff x="0" y="0"/>
+          <a:chExt cx="0" cy="0"/>
+        </a:xfrm>
+      </p:grpSpPr>
+      <p:sp>
+        <p:nvSpPr>
+          <p:cNvPr id="2" name="Title 1">
+            <a:extLst>
+              <a:ext uri="{FF2B5EF4-FFF2-40B4-BE49-F238E27FC236}">
+                <a16:creationId xmlns:a16="http://schemas.microsoft.com/office/drawing/2014/main" id="{C554AC7F-83F8-7014-61D3-A290E4AFB297}"/>
+              </a:ext>
+            </a:extLst>
+          </p:cNvPr>
+          <p:cNvSpPr>
+            <a:spLocks noGrp="1"/>
+          </p:cNvSpPr>
+          <p:nvPr>
+            <p:ph type="title"/>
+          </p:nvPr>
+        </p:nvSpPr>
+        <p:spPr/>
+        <p:txBody>
+          <a:bodyPr/>
+          <a:lstStyle/>
+          <a:p>
+            <a:r>
+              <a:rPr lang="en-US" b="1" dirty="0">
+                <a:solidFill>
+                  <a:schemeClr val="accent1">
+                    <a:lumMod val="75000"/>
+                  </a:schemeClr>
+                </a:solidFill>
+              </a:rPr>
+              <a:t>Exercise 4: Solution</a:t>
+            </a:r>
+            <a:endParaRPr lang="en-US" dirty="0"/>
+          </a:p>
+        </p:txBody>
+      </p:sp>
+      <p:sp>
+        <p:nvSpPr>
+          <p:cNvPr id="3" name="Content Placeholder 2">
+            <a:extLst>
+              <a:ext uri="{FF2B5EF4-FFF2-40B4-BE49-F238E27FC236}">
+                <a16:creationId xmlns:a16="http://schemas.microsoft.com/office/drawing/2014/main" id="{C525A007-A8EE-CD6D-6800-C06E6CB49CB0}"/>
+              </a:ext>
+            </a:extLst>
+          </p:cNvPr>
+          <p:cNvSpPr>
+            <a:spLocks noGrp="1"/>
+          </p:cNvSpPr>
+          <p:nvPr>
+            <p:ph idx="1"/>
+          </p:nvPr>
+        </p:nvSpPr>
+        <p:spPr/>
+        <p:txBody>
+          <a:bodyPr>
+            <a:normAutofit lnSpcReduction="10000"/>
+          </a:bodyPr>
+          <a:lstStyle/>
+          <a:p>
+            <a:pPr marL="0" indent="0">
+              <a:buNone/>
+            </a:pPr>
+            <a:r>
+              <a:rPr lang="en-US" dirty="0"/>
+              <a:t>def </a:t>
+            </a:r>
+            <a:r>
+              <a:rPr lang="en-US" dirty="0" err="1"/>
+              <a:t>findVowels</a:t>
+            </a:r>
+            <a:r>
+              <a:rPr lang="en-US" dirty="0"/>
+              <a:t>(ser):</a:t>
+            </a:r>
+          </a:p>
+          <a:p>
+            <a:pPr marL="0" indent="0">
+              <a:buNone/>
+            </a:pPr>
+            <a:r>
+              <a:rPr lang="en-US" dirty="0"/>
+              <a:t>vowels = ["a", "e","</a:t>
+            </a:r>
+            <a:r>
+              <a:rPr lang="en-US" dirty="0" err="1"/>
+              <a:t>i</a:t>
+            </a:r>
+            <a:r>
+              <a:rPr lang="en-US" dirty="0"/>
+              <a:t>", "o", "u"]</a:t>
+            </a:r>
+          </a:p>
+          <a:p>
+            <a:pPr marL="0" indent="0">
+              <a:buNone/>
+            </a:pPr>
+            <a:r>
+              <a:rPr lang="en-US" dirty="0"/>
+              <a:t>for </a:t>
+            </a:r>
+            <a:r>
+              <a:rPr lang="en-US" dirty="0" err="1"/>
+              <a:t>ind</a:t>
+            </a:r>
+            <a:r>
+              <a:rPr lang="en-US" dirty="0"/>
+              <a:t>, word in enumerate(ser):</a:t>
+            </a:r>
+          </a:p>
+          <a:p>
+            <a:pPr marL="0" indent="0">
+              <a:buNone/>
+            </a:pPr>
+            <a:r>
+              <a:rPr lang="en-US" dirty="0"/>
+              <a:t>    </a:t>
+            </a:r>
+            <a:r>
+              <a:rPr lang="en-US" dirty="0" err="1"/>
+              <a:t>vow_counts</a:t>
+            </a:r>
+            <a:r>
+              <a:rPr lang="en-US" dirty="0"/>
+              <a:t> = 0</a:t>
+            </a:r>
+          </a:p>
+          <a:p>
+            <a:pPr marL="0" indent="0">
+              <a:buNone/>
+            </a:pPr>
+            <a:r>
+              <a:rPr lang="en-US" dirty="0"/>
+              <a:t>    for letter in word:</a:t>
+            </a:r>
+          </a:p>
+          <a:p>
+            <a:pPr marL="0" indent="0">
+              <a:buNone/>
+            </a:pPr>
+            <a:r>
+              <a:rPr lang="en-US" dirty="0"/>
+              <a:t>        if </a:t>
+            </a:r>
+            <a:r>
+              <a:rPr lang="en-US" dirty="0" err="1"/>
+              <a:t>letter.lower</a:t>
+            </a:r>
+            <a:r>
+              <a:rPr lang="en-US" dirty="0"/>
+              <a:t>() in vowels:</a:t>
+            </a:r>
+          </a:p>
+          <a:p>
+            <a:pPr marL="0" indent="0">
+              <a:buNone/>
+            </a:pPr>
+            <a:r>
+              <a:rPr lang="en-US" dirty="0"/>
+              <a:t>            </a:t>
+            </a:r>
+            <a:r>
+              <a:rPr lang="en-US" dirty="0" err="1"/>
+              <a:t>vow_counts</a:t>
+            </a:r>
+            <a:r>
+              <a:rPr lang="en-US" dirty="0"/>
+              <a:t> = </a:t>
+            </a:r>
+            <a:r>
+              <a:rPr lang="en-US" dirty="0" err="1"/>
+              <a:t>vow_counts</a:t>
+            </a:r>
+            <a:r>
+              <a:rPr lang="en-US" dirty="0"/>
+              <a:t> +1</a:t>
+            </a:r>
+          </a:p>
+          <a:p>
+            <a:pPr marL="0" indent="0">
+              <a:buNone/>
+            </a:pPr>
+            <a:r>
+              <a:rPr lang="en-US" dirty="0"/>
+              <a:t>    if </a:t>
+            </a:r>
+            <a:r>
+              <a:rPr lang="en-US" dirty="0" err="1"/>
+              <a:t>vow_counts</a:t>
+            </a:r>
+            <a:r>
+              <a:rPr lang="en-US" dirty="0"/>
+              <a:t> &gt;= 2:</a:t>
+            </a:r>
+          </a:p>
+          <a:p>
+            <a:pPr marL="0" indent="0">
+              <a:buNone/>
+            </a:pPr>
+            <a:r>
+              <a:rPr lang="en-US" dirty="0"/>
+              <a:t>        print(</a:t>
+            </a:r>
+            <a:r>
+              <a:rPr lang="en-US" dirty="0" err="1"/>
+              <a:t>ind</a:t>
+            </a:r>
+            <a:r>
+              <a:rPr lang="en-US" dirty="0"/>
+              <a:t>, " ", word)</a:t>
+            </a:r>
+          </a:p>
+          <a:p>
+            <a:pPr marL="0" indent="0">
+              <a:buNone/>
+            </a:pPr>
+            <a:endParaRPr lang="en-US" dirty="0"/>
+          </a:p>
+        </p:txBody>
+      </p:sp>
+      <p:sp>
+        <p:nvSpPr>
+          <p:cNvPr id="4" name="Slide Number Placeholder 3">
+            <a:extLst>
+              <a:ext uri="{FF2B5EF4-FFF2-40B4-BE49-F238E27FC236}">
+                <a16:creationId xmlns:a16="http://schemas.microsoft.com/office/drawing/2014/main" id="{536DC667-8273-C810-1058-FB32AFE64120}"/>
+              </a:ext>
+            </a:extLst>
+          </p:cNvPr>
+          <p:cNvSpPr>
+            <a:spLocks noGrp="1"/>
+          </p:cNvSpPr>
+          <p:nvPr>
+            <p:ph type="sldNum" sz="quarter" idx="12"/>
+          </p:nvPr>
+        </p:nvSpPr>
+        <p:spPr/>
+        <p:txBody>
+          <a:bodyPr/>
+          <a:lstStyle/>
+          <a:p>
+            <a:fld id="{491CF4B3-B97C-1B49-985A-93725184CD23}" type="slidenum">
+              <a:rPr lang="en-US" smtClean="0"/>
+              <a:t>14</a:t>
+            </a:fld>
+            <a:endParaRPr lang="en-US"/>
+          </a:p>
+        </p:txBody>
+      </p:sp>
+    </p:spTree>
+    <p:extLst>
+      <p:ext uri="{BB962C8B-B14F-4D97-AF65-F5344CB8AC3E}">
+        <p14:creationId xmlns:p14="http://schemas.microsoft.com/office/powerpoint/2010/main" val="2778431982"/>
+      </p:ext>
+    </p:extLst>
+  </p:cSld>
+  <p:clrMapOvr>
+    <a:masterClrMapping/>
+  </p:clrMapOvr>
+</p:sld>
+</file>
+
+<file path=ppt/slides/slide15.xml><?xml version="1.0" encoding="utf-8"?>
+<p:sld xmlns:a="http://schemas.openxmlformats.org/drawingml/2006/main" xmlns:r="http://schemas.openxmlformats.org/officeDocument/2006/relationships" xmlns:p="http://schemas.openxmlformats.org/presentationml/2006/main">
+  <p:cSld>
+    <p:spTree>
+      <p:nvGrpSpPr>
+        <p:cNvPr id="1" name=""/>
+        <p:cNvGrpSpPr/>
+        <p:nvPr/>
+      </p:nvGrpSpPr>
+      <p:grpSpPr>
+        <a:xfrm>
+          <a:off x="0" y="0"/>
+          <a:ext cx="0" cy="0"/>
+          <a:chOff x="0" y="0"/>
+          <a:chExt cx="0" cy="0"/>
+        </a:xfrm>
+      </p:grpSpPr>
+      <p:sp>
+        <p:nvSpPr>
+          <p:cNvPr id="2" name="Title 1">
+            <a:extLst>
+              <a:ext uri="{FF2B5EF4-FFF2-40B4-BE49-F238E27FC236}">
+                <a16:creationId xmlns:a16="http://schemas.microsoft.com/office/drawing/2014/main" id="{F09FF703-C6F3-15F9-1311-CDB4CCA1D90E}"/>
+              </a:ext>
+            </a:extLst>
+          </p:cNvPr>
+          <p:cNvSpPr>
+            <a:spLocks noGrp="1"/>
+          </p:cNvSpPr>
+          <p:nvPr>
+            <p:ph type="title"/>
+          </p:nvPr>
+        </p:nvSpPr>
+        <p:spPr/>
+        <p:txBody>
+          <a:bodyPr/>
+          <a:lstStyle/>
+          <a:p>
+            <a:r>
+              <a:rPr lang="en-US" b="1" dirty="0">
+                <a:solidFill>
+                  <a:schemeClr val="accent1">
+                    <a:lumMod val="75000"/>
+                  </a:schemeClr>
+                </a:solidFill>
+              </a:rPr>
+              <a:t>Exercise 5: Pig Latin</a:t>
+            </a:r>
+            <a:r>
+              <a:rPr lang="en-US" dirty="0"/>
+              <a:t>⭐️ ⭐️</a:t>
+            </a:r>
+          </a:p>
+        </p:txBody>
+      </p:sp>
+      <p:sp>
+        <p:nvSpPr>
+          <p:cNvPr id="3" name="Content Placeholder 2">
+            <a:extLst>
+              <a:ext uri="{FF2B5EF4-FFF2-40B4-BE49-F238E27FC236}">
+                <a16:creationId xmlns:a16="http://schemas.microsoft.com/office/drawing/2014/main" id="{AC57F3EF-4B4A-0279-F444-E5F08302E681}"/>
+              </a:ext>
+            </a:extLst>
+          </p:cNvPr>
+          <p:cNvSpPr>
+            <a:spLocks noGrp="1"/>
+          </p:cNvSpPr>
+          <p:nvPr>
+            <p:ph idx="1"/>
+          </p:nvPr>
+        </p:nvSpPr>
+        <p:spPr/>
+        <p:txBody>
+          <a:bodyPr>
+            <a:normAutofit fontScale="92500" lnSpcReduction="20000"/>
+          </a:bodyPr>
+          <a:lstStyle/>
+          <a:p>
+            <a:pPr marL="0" indent="0">
+              <a:buNone/>
+            </a:pPr>
+            <a:r>
+              <a:rPr lang="en-US" dirty="0"/>
+              <a:t>Write function that translates a text to Pig Latin and back. English is translated to Pig Latin by taking the first letter of every word, moving it to the end of the word and adding ‘ay’.</a:t>
+            </a:r>
+          </a:p>
+          <a:p>
+            <a:pPr marL="0" indent="0">
+              <a:buNone/>
+            </a:pPr>
+            <a:endParaRPr lang="en-US" dirty="0"/>
+          </a:p>
+          <a:p>
+            <a:pPr marL="0" indent="0">
+              <a:buNone/>
+            </a:pPr>
+            <a:r>
+              <a:rPr lang="en-US" dirty="0"/>
+              <a:t>Input</a:t>
+            </a:r>
+          </a:p>
+          <a:p>
+            <a:pPr marL="0" indent="0">
+              <a:buNone/>
+            </a:pPr>
+            <a:endParaRPr lang="en-US" dirty="0"/>
+          </a:p>
+          <a:p>
+            <a:pPr marL="0" indent="0">
+              <a:buNone/>
+            </a:pPr>
+            <a:r>
+              <a:rPr lang="en-US" dirty="0"/>
+              <a:t> “The quick brown fox” </a:t>
+            </a:r>
+          </a:p>
+          <a:p>
+            <a:pPr marL="0" indent="0">
+              <a:buNone/>
+            </a:pPr>
+            <a:endParaRPr lang="en-US" dirty="0"/>
+          </a:p>
+          <a:p>
+            <a:pPr marL="0" indent="0">
+              <a:buNone/>
+            </a:pPr>
+            <a:r>
+              <a:rPr lang="en-US" dirty="0"/>
+              <a:t>Desired output </a:t>
+            </a:r>
+          </a:p>
+          <a:p>
+            <a:pPr marL="0" indent="0">
+              <a:buNone/>
+            </a:pPr>
+            <a:endParaRPr lang="en-US" dirty="0"/>
+          </a:p>
+          <a:p>
+            <a:pPr marL="0" indent="0">
+              <a:buNone/>
+            </a:pPr>
+            <a:r>
+              <a:rPr lang="en-US" dirty="0"/>
+              <a:t>“</a:t>
+            </a:r>
+            <a:r>
+              <a:rPr lang="en-US" dirty="0" err="1"/>
+              <a:t>Hetay</a:t>
+            </a:r>
+            <a:r>
+              <a:rPr lang="en-US" dirty="0"/>
+              <a:t> </a:t>
+            </a:r>
+            <a:r>
+              <a:rPr lang="en-US" dirty="0" err="1"/>
+              <a:t>uickqay</a:t>
+            </a:r>
+            <a:r>
+              <a:rPr lang="en-US" dirty="0"/>
+              <a:t> </a:t>
+            </a:r>
+            <a:r>
+              <a:rPr lang="en-US" dirty="0" err="1"/>
+              <a:t>rownbay</a:t>
+            </a:r>
+            <a:r>
+              <a:rPr lang="en-US" dirty="0"/>
+              <a:t> </a:t>
+            </a:r>
+            <a:r>
+              <a:rPr lang="en-US" dirty="0" err="1"/>
+              <a:t>oxfay</a:t>
+            </a:r>
+            <a:r>
+              <a:rPr lang="en-US" dirty="0"/>
+              <a:t>”</a:t>
+            </a:r>
+          </a:p>
+          <a:p>
+            <a:pPr marL="0" indent="0">
+              <a:buNone/>
+            </a:pPr>
+            <a:endParaRPr lang="en-US" dirty="0"/>
+          </a:p>
+          <a:p>
+            <a:pPr marL="0" indent="0">
+              <a:buNone/>
+            </a:pPr>
+            <a:endParaRPr lang="en-US" dirty="0"/>
+          </a:p>
+        </p:txBody>
+      </p:sp>
+      <p:sp>
+        <p:nvSpPr>
+          <p:cNvPr id="4" name="Slide Number Placeholder 3">
+            <a:extLst>
+              <a:ext uri="{FF2B5EF4-FFF2-40B4-BE49-F238E27FC236}">
+                <a16:creationId xmlns:a16="http://schemas.microsoft.com/office/drawing/2014/main" id="{D86A482B-F7C0-CF99-A20E-51634A56B6EF}"/>
+              </a:ext>
+            </a:extLst>
+          </p:cNvPr>
+          <p:cNvSpPr>
+            <a:spLocks noGrp="1"/>
+          </p:cNvSpPr>
+          <p:nvPr>
+            <p:ph type="sldNum" sz="quarter" idx="12"/>
+          </p:nvPr>
+        </p:nvSpPr>
+        <p:spPr/>
+        <p:txBody>
+          <a:bodyPr/>
+          <a:lstStyle/>
+          <a:p>
+            <a:fld id="{491CF4B3-B97C-1B49-985A-93725184CD23}" type="slidenum">
+              <a:rPr lang="en-US" smtClean="0"/>
+              <a:t>15</a:t>
+            </a:fld>
+            <a:endParaRPr lang="en-US"/>
+          </a:p>
+        </p:txBody>
+      </p:sp>
+    </p:spTree>
+    <p:extLst>
+      <p:ext uri="{BB962C8B-B14F-4D97-AF65-F5344CB8AC3E}">
+        <p14:creationId xmlns:p14="http://schemas.microsoft.com/office/powerpoint/2010/main" val="666086485"/>
+      </p:ext>
+    </p:extLst>
+  </p:cSld>
+  <p:clrMapOvr>
+    <a:masterClrMapping/>
+  </p:clrMapOvr>
+</p:sld>
+</file>
+
+<file path=ppt/slides/slide16.xml><?xml version="1.0" encoding="utf-8"?>
+<p:sld xmlns:a="http://schemas.openxmlformats.org/drawingml/2006/main" xmlns:r="http://schemas.openxmlformats.org/officeDocument/2006/relationships" xmlns:p="http://schemas.openxmlformats.org/presentationml/2006/main">
+  <p:cSld>
+    <p:spTree>
+      <p:nvGrpSpPr>
+        <p:cNvPr id="1" name=""/>
+        <p:cNvGrpSpPr/>
+        <p:nvPr/>
+      </p:nvGrpSpPr>
+      <p:grpSpPr>
+        <a:xfrm>
+          <a:off x="0" y="0"/>
+          <a:ext cx="0" cy="0"/>
+          <a:chOff x="0" y="0"/>
+          <a:chExt cx="0" cy="0"/>
+        </a:xfrm>
+      </p:grpSpPr>
+      <p:sp>
+        <p:nvSpPr>
+          <p:cNvPr id="2" name="Title 1">
+            <a:extLst>
+              <a:ext uri="{FF2B5EF4-FFF2-40B4-BE49-F238E27FC236}">
+                <a16:creationId xmlns:a16="http://schemas.microsoft.com/office/drawing/2014/main" id="{C554AC7F-83F8-7014-61D3-A290E4AFB297}"/>
+              </a:ext>
+            </a:extLst>
+          </p:cNvPr>
+          <p:cNvSpPr>
+            <a:spLocks noGrp="1"/>
+          </p:cNvSpPr>
+          <p:nvPr>
+            <p:ph type="title"/>
+          </p:nvPr>
+        </p:nvSpPr>
+        <p:spPr/>
+        <p:txBody>
+          <a:bodyPr/>
+          <a:lstStyle/>
+          <a:p>
+            <a:r>
+              <a:rPr lang="en-US" b="1" dirty="0">
+                <a:solidFill>
+                  <a:schemeClr val="accent1">
+                    <a:lumMod val="75000"/>
+                  </a:schemeClr>
+                </a:solidFill>
+              </a:rPr>
+              <a:t>Exercise 5: Solution</a:t>
+            </a:r>
+            <a:endParaRPr lang="en-US" dirty="0"/>
+          </a:p>
+        </p:txBody>
+      </p:sp>
+      <p:sp>
+        <p:nvSpPr>
+          <p:cNvPr id="3" name="Content Placeholder 2">
+            <a:extLst>
+              <a:ext uri="{FF2B5EF4-FFF2-40B4-BE49-F238E27FC236}">
+                <a16:creationId xmlns:a16="http://schemas.microsoft.com/office/drawing/2014/main" id="{C525A007-A8EE-CD6D-6800-C06E6CB49CB0}"/>
+              </a:ext>
+            </a:extLst>
+          </p:cNvPr>
+          <p:cNvSpPr>
+            <a:spLocks noGrp="1"/>
+          </p:cNvSpPr>
+          <p:nvPr>
+            <p:ph idx="1"/>
+          </p:nvPr>
+        </p:nvSpPr>
+        <p:spPr/>
+        <p:txBody>
+          <a:bodyPr>
+            <a:normAutofit/>
+          </a:bodyPr>
+          <a:lstStyle/>
+          <a:p>
+            <a:pPr marL="0" indent="0">
+              <a:buNone/>
+            </a:pPr>
+            <a:r>
+              <a:rPr lang="en-US" dirty="0"/>
+              <a:t>def </a:t>
+            </a:r>
+            <a:r>
+              <a:rPr lang="en-US" dirty="0" err="1"/>
+              <a:t>piglatin</a:t>
+            </a:r>
+            <a:r>
+              <a:rPr lang="en-US" dirty="0"/>
+              <a:t>(sentence):</a:t>
+            </a:r>
+          </a:p>
+          <a:p>
+            <a:pPr marL="0" indent="0">
+              <a:buNone/>
+            </a:pPr>
+            <a:r>
+              <a:rPr lang="en-US" dirty="0"/>
+              <a:t>    </a:t>
+            </a:r>
+            <a:r>
+              <a:rPr lang="en-US" dirty="0" err="1"/>
+              <a:t>list_words</a:t>
+            </a:r>
+            <a:r>
+              <a:rPr lang="en-US" dirty="0"/>
+              <a:t> = </a:t>
+            </a:r>
+            <a:r>
+              <a:rPr lang="en-US" dirty="0" err="1"/>
+              <a:t>sentence.split</a:t>
+            </a:r>
+            <a:r>
+              <a:rPr lang="en-US" dirty="0"/>
+              <a:t>(" ")</a:t>
+            </a:r>
+          </a:p>
+          <a:p>
+            <a:pPr marL="0" indent="0">
+              <a:buNone/>
+            </a:pPr>
+            <a:r>
+              <a:rPr lang="en-US" dirty="0"/>
+              <a:t>    </a:t>
+            </a:r>
+            <a:r>
+              <a:rPr lang="en-US" dirty="0" err="1"/>
+              <a:t>new_sent</a:t>
+            </a:r>
+            <a:r>
+              <a:rPr lang="en-US" dirty="0"/>
+              <a:t> = ""</a:t>
+            </a:r>
+          </a:p>
+          <a:p>
+            <a:pPr marL="0" indent="0">
+              <a:buNone/>
+            </a:pPr>
+            <a:r>
+              <a:rPr lang="en-US" dirty="0"/>
+              <a:t>    for word in </a:t>
+            </a:r>
+            <a:r>
+              <a:rPr lang="en-US" dirty="0" err="1"/>
+              <a:t>list_words</a:t>
+            </a:r>
+            <a:r>
+              <a:rPr lang="en-US" dirty="0"/>
+              <a:t>:</a:t>
+            </a:r>
+          </a:p>
+          <a:p>
+            <a:pPr marL="0" indent="0">
+              <a:buNone/>
+            </a:pPr>
+            <a:r>
+              <a:rPr lang="en-US" dirty="0"/>
+              <a:t>        </a:t>
+            </a:r>
+            <a:r>
+              <a:rPr lang="en-US" dirty="0" err="1"/>
+              <a:t>new_word</a:t>
+            </a:r>
+            <a:r>
+              <a:rPr lang="en-US" dirty="0"/>
+              <a:t> = word[1:]+word[0]+"ay"</a:t>
+            </a:r>
+          </a:p>
+          <a:p>
+            <a:pPr marL="0" indent="0">
+              <a:buNone/>
+            </a:pPr>
+            <a:r>
+              <a:rPr lang="en-US" dirty="0"/>
+              <a:t>        </a:t>
+            </a:r>
+            <a:r>
+              <a:rPr lang="en-US" dirty="0" err="1"/>
+              <a:t>new_sent</a:t>
+            </a:r>
+            <a:r>
+              <a:rPr lang="en-US" dirty="0"/>
+              <a:t> = </a:t>
+            </a:r>
+            <a:r>
+              <a:rPr lang="en-US" dirty="0" err="1"/>
+              <a:t>new_sent</a:t>
+            </a:r>
+            <a:r>
+              <a:rPr lang="en-US" dirty="0"/>
+              <a:t> + </a:t>
+            </a:r>
+            <a:r>
+              <a:rPr lang="en-US" dirty="0" err="1"/>
+              <a:t>new_word</a:t>
+            </a:r>
+            <a:r>
+              <a:rPr lang="en-US" dirty="0"/>
+              <a:t> + " "</a:t>
+            </a:r>
+          </a:p>
+          <a:p>
+            <a:pPr marL="0" indent="0">
+              <a:buNone/>
+            </a:pPr>
+            <a:r>
+              <a:rPr lang="en-US" dirty="0"/>
+              <a:t>    return </a:t>
+            </a:r>
+            <a:r>
+              <a:rPr lang="en-US" dirty="0" err="1"/>
+              <a:t>new_sent</a:t>
+            </a:r>
+            <a:endParaRPr lang="en-US" dirty="0"/>
+          </a:p>
+          <a:p>
+            <a:pPr marL="0" indent="0">
+              <a:buNone/>
+            </a:pPr>
+            <a:endParaRPr lang="en-US" dirty="0"/>
+          </a:p>
+        </p:txBody>
+      </p:sp>
+      <p:sp>
+        <p:nvSpPr>
+          <p:cNvPr id="4" name="Slide Number Placeholder 3">
+            <a:extLst>
+              <a:ext uri="{FF2B5EF4-FFF2-40B4-BE49-F238E27FC236}">
+                <a16:creationId xmlns:a16="http://schemas.microsoft.com/office/drawing/2014/main" id="{536DC667-8273-C810-1058-FB32AFE64120}"/>
+              </a:ext>
+            </a:extLst>
+          </p:cNvPr>
+          <p:cNvSpPr>
+            <a:spLocks noGrp="1"/>
+          </p:cNvSpPr>
+          <p:nvPr>
+            <p:ph type="sldNum" sz="quarter" idx="12"/>
+          </p:nvPr>
+        </p:nvSpPr>
+        <p:spPr/>
+        <p:txBody>
+          <a:bodyPr/>
+          <a:lstStyle/>
+          <a:p>
+            <a:fld id="{491CF4B3-B97C-1B49-985A-93725184CD23}" type="slidenum">
+              <a:rPr lang="en-US" smtClean="0"/>
+              <a:t>16</a:t>
+            </a:fld>
+            <a:endParaRPr lang="en-US"/>
+          </a:p>
+        </p:txBody>
+      </p:sp>
+    </p:spTree>
+    <p:extLst>
+      <p:ext uri="{BB962C8B-B14F-4D97-AF65-F5344CB8AC3E}">
+        <p14:creationId xmlns:p14="http://schemas.microsoft.com/office/powerpoint/2010/main" val="753707124"/>
+      </p:ext>
+    </p:extLst>
+  </p:cSld>
+  <p:clrMapOvr>
+    <a:masterClrMapping/>
+  </p:clrMapOvr>
+</p:sld>
+</file>
+
+<file path=ppt/slides/slide17.xml><?xml version="1.0" encoding="utf-8"?>
+<p:sld xmlns:a="http://schemas.openxmlformats.org/drawingml/2006/main" xmlns:r="http://schemas.openxmlformats.org/officeDocument/2006/relationships" xmlns:p="http://schemas.openxmlformats.org/presentationml/2006/main">
+  <p:cSld>
+    <p:spTree>
+      <p:nvGrpSpPr>
+        <p:cNvPr id="1" name=""/>
+        <p:cNvGrpSpPr/>
+        <p:nvPr/>
+      </p:nvGrpSpPr>
+      <p:grpSpPr>
+        <a:xfrm>
+          <a:off x="0" y="0"/>
+          <a:ext cx="0" cy="0"/>
+          <a:chOff x="0" y="0"/>
+          <a:chExt cx="0" cy="0"/>
+        </a:xfrm>
+      </p:grpSpPr>
+      <p:sp>
+        <p:nvSpPr>
+          <p:cNvPr id="2" name="Title 1">
+            <a:extLst>
+              <a:ext uri="{FF2B5EF4-FFF2-40B4-BE49-F238E27FC236}">
+                <a16:creationId xmlns:a16="http://schemas.microsoft.com/office/drawing/2014/main" id="{5A0DC5C4-5BF0-1771-6E64-CE50F1A41C8A}"/>
+              </a:ext>
+            </a:extLst>
+          </p:cNvPr>
+          <p:cNvSpPr>
+            <a:spLocks noGrp="1"/>
+          </p:cNvSpPr>
+          <p:nvPr>
+            <p:ph type="title"/>
+          </p:nvPr>
+        </p:nvSpPr>
+        <p:spPr/>
+        <p:txBody>
+          <a:bodyPr/>
+          <a:lstStyle/>
+          <a:p>
+            <a:r>
+              <a:rPr lang="en-US" b="1" dirty="0">
+                <a:solidFill>
+                  <a:schemeClr val="accent1">
+                    <a:lumMod val="75000"/>
+                  </a:schemeClr>
+                </a:solidFill>
+              </a:rPr>
+              <a:t>Exercise 6: Taylor Swift Songs</a:t>
+            </a:r>
+            <a:r>
+              <a:rPr lang="en-US" dirty="0"/>
+              <a:t>⭐️ ⭐️</a:t>
+            </a:r>
+          </a:p>
+        </p:txBody>
+      </p:sp>
+      <p:sp>
+        <p:nvSpPr>
+          <p:cNvPr id="3" name="Content Placeholder 2">
+            <a:extLst>
+              <a:ext uri="{FF2B5EF4-FFF2-40B4-BE49-F238E27FC236}">
+                <a16:creationId xmlns:a16="http://schemas.microsoft.com/office/drawing/2014/main" id="{B0F97B5E-1DBA-C20C-66C2-FF0EEA6C8DE0}"/>
+              </a:ext>
+            </a:extLst>
+          </p:cNvPr>
+          <p:cNvSpPr>
+            <a:spLocks noGrp="1"/>
+          </p:cNvSpPr>
+          <p:nvPr>
+            <p:ph idx="1"/>
+          </p:nvPr>
+        </p:nvSpPr>
+        <p:spPr/>
+        <p:txBody>
+          <a:bodyPr/>
+          <a:lstStyle/>
+          <a:p>
+            <a:pPr marL="0" indent="0">
+              <a:buNone/>
+            </a:pPr>
+            <a:r>
+              <a:rPr lang="en-US" dirty="0"/>
+              <a:t>Write a function that finds the top 10 songs with the highest danceability and then prints the one with the highest popularity.</a:t>
+            </a:r>
+          </a:p>
+          <a:p>
+            <a:endParaRPr lang="en-US" dirty="0"/>
+          </a:p>
+        </p:txBody>
+      </p:sp>
+      <p:sp>
+        <p:nvSpPr>
+          <p:cNvPr id="4" name="Slide Number Placeholder 3">
+            <a:extLst>
+              <a:ext uri="{FF2B5EF4-FFF2-40B4-BE49-F238E27FC236}">
+                <a16:creationId xmlns:a16="http://schemas.microsoft.com/office/drawing/2014/main" id="{5069E6F0-D63E-3B8B-A559-19357FDC4823}"/>
+              </a:ext>
+            </a:extLst>
+          </p:cNvPr>
+          <p:cNvSpPr>
+            <a:spLocks noGrp="1"/>
+          </p:cNvSpPr>
+          <p:nvPr>
+            <p:ph type="sldNum" sz="quarter" idx="12"/>
+          </p:nvPr>
+        </p:nvSpPr>
+        <p:spPr/>
+        <p:txBody>
+          <a:bodyPr/>
+          <a:lstStyle/>
+          <a:p>
+            <a:fld id="{491CF4B3-B97C-1B49-985A-93725184CD23}" type="slidenum">
+              <a:rPr lang="en-US" smtClean="0"/>
+              <a:t>17</a:t>
+            </a:fld>
+            <a:endParaRPr lang="en-US"/>
+          </a:p>
+        </p:txBody>
+      </p:sp>
+    </p:spTree>
+    <p:extLst>
+      <p:ext uri="{BB962C8B-B14F-4D97-AF65-F5344CB8AC3E}">
+        <p14:creationId xmlns:p14="http://schemas.microsoft.com/office/powerpoint/2010/main" val="3359104509"/>
+      </p:ext>
+    </p:extLst>
+  </p:cSld>
+  <p:clrMapOvr>
+    <a:masterClrMapping/>
+  </p:clrMapOvr>
+</p:sld>
+</file>
+
+<file path=ppt/slides/slide18.xml><?xml version="1.0" encoding="utf-8"?>
+<p:sld xmlns:a="http://schemas.openxmlformats.org/drawingml/2006/main" xmlns:r="http://schemas.openxmlformats.org/officeDocument/2006/relationships" xmlns:p="http://schemas.openxmlformats.org/presentationml/2006/main">
+  <p:cSld>
+    <p:spTree>
+      <p:nvGrpSpPr>
+        <p:cNvPr id="1" name=""/>
+        <p:cNvGrpSpPr/>
+        <p:nvPr/>
+      </p:nvGrpSpPr>
+      <p:grpSpPr>
+        <a:xfrm>
+          <a:off x="0" y="0"/>
+          <a:ext cx="0" cy="0"/>
+          <a:chOff x="0" y="0"/>
+          <a:chExt cx="0" cy="0"/>
+        </a:xfrm>
+      </p:grpSpPr>
+      <p:sp>
+        <p:nvSpPr>
+          <p:cNvPr id="2" name="Title 1">
+            <a:extLst>
+              <a:ext uri="{FF2B5EF4-FFF2-40B4-BE49-F238E27FC236}">
+                <a16:creationId xmlns:a16="http://schemas.microsoft.com/office/drawing/2014/main" id="{C554AC7F-83F8-7014-61D3-A290E4AFB297}"/>
+              </a:ext>
+            </a:extLst>
+          </p:cNvPr>
+          <p:cNvSpPr>
+            <a:spLocks noGrp="1"/>
+          </p:cNvSpPr>
+          <p:nvPr>
+            <p:ph type="title"/>
+          </p:nvPr>
+        </p:nvSpPr>
+        <p:spPr/>
+        <p:txBody>
+          <a:bodyPr/>
+          <a:lstStyle/>
+          <a:p>
+            <a:r>
+              <a:rPr lang="en-US" b="1" dirty="0">
+                <a:solidFill>
+                  <a:schemeClr val="accent1">
+                    <a:lumMod val="75000"/>
+                  </a:schemeClr>
+                </a:solidFill>
+              </a:rPr>
+              <a:t>Exercise 6: Solution</a:t>
+            </a:r>
+            <a:endParaRPr lang="en-US" dirty="0"/>
+          </a:p>
+        </p:txBody>
+      </p:sp>
+      <p:sp>
+        <p:nvSpPr>
+          <p:cNvPr id="3" name="Content Placeholder 2">
+            <a:extLst>
+              <a:ext uri="{FF2B5EF4-FFF2-40B4-BE49-F238E27FC236}">
+                <a16:creationId xmlns:a16="http://schemas.microsoft.com/office/drawing/2014/main" id="{C525A007-A8EE-CD6D-6800-C06E6CB49CB0}"/>
+              </a:ext>
+            </a:extLst>
+          </p:cNvPr>
+          <p:cNvSpPr>
+            <a:spLocks noGrp="1"/>
+          </p:cNvSpPr>
+          <p:nvPr>
+            <p:ph idx="1"/>
+          </p:nvPr>
+        </p:nvSpPr>
+        <p:spPr/>
+        <p:txBody>
+          <a:bodyPr>
+            <a:normAutofit/>
+          </a:bodyPr>
+          <a:lstStyle/>
+          <a:p>
+            <a:pPr marL="0" indent="0">
+              <a:buNone/>
+            </a:pPr>
+            <a:endParaRPr lang="en-US" dirty="0"/>
+          </a:p>
+        </p:txBody>
+      </p:sp>
+      <p:sp>
+        <p:nvSpPr>
+          <p:cNvPr id="4" name="Slide Number Placeholder 3">
+            <a:extLst>
+              <a:ext uri="{FF2B5EF4-FFF2-40B4-BE49-F238E27FC236}">
+                <a16:creationId xmlns:a16="http://schemas.microsoft.com/office/drawing/2014/main" id="{536DC667-8273-C810-1058-FB32AFE64120}"/>
+              </a:ext>
+            </a:extLst>
+          </p:cNvPr>
+          <p:cNvSpPr>
+            <a:spLocks noGrp="1"/>
+          </p:cNvSpPr>
+          <p:nvPr>
+            <p:ph type="sldNum" sz="quarter" idx="12"/>
+          </p:nvPr>
+        </p:nvSpPr>
+        <p:spPr/>
+        <p:txBody>
+          <a:bodyPr/>
+          <a:lstStyle/>
+          <a:p>
+            <a:fld id="{491CF4B3-B97C-1B49-985A-93725184CD23}" type="slidenum">
+              <a:rPr lang="en-US" smtClean="0"/>
+              <a:t>18</a:t>
+            </a:fld>
+            <a:endParaRPr lang="en-US"/>
+          </a:p>
+        </p:txBody>
+      </p:sp>
+    </p:spTree>
+    <p:extLst>
+      <p:ext uri="{BB962C8B-B14F-4D97-AF65-F5344CB8AC3E}">
+        <p14:creationId xmlns:p14="http://schemas.microsoft.com/office/powerpoint/2010/main" val="2572373931"/>
+      </p:ext>
+    </p:extLst>
+  </p:cSld>
+  <p:clrMapOvr>
+    <a:masterClrMapping/>
+  </p:clrMapOvr>
+</p:sld>
+</file>
+
+<file path=ppt/slides/slide19.xml><?xml version="1.0" encoding="utf-8"?>
+<p:sld xmlns:a="http://schemas.openxmlformats.org/drawingml/2006/main" xmlns:r="http://schemas.openxmlformats.org/officeDocument/2006/relationships" xmlns:p="http://schemas.openxmlformats.org/presentationml/2006/main">
+  <p:cSld>
+    <p:spTree>
+      <p:nvGrpSpPr>
+        <p:cNvPr id="1" name=""/>
+        <p:cNvGrpSpPr/>
+        <p:nvPr/>
+      </p:nvGrpSpPr>
+      <p:grpSpPr>
+        <a:xfrm>
+          <a:off x="0" y="0"/>
+          <a:ext cx="0" cy="0"/>
+          <a:chOff x="0" y="0"/>
+          <a:chExt cx="0" cy="0"/>
+        </a:xfrm>
+      </p:grpSpPr>
+      <p:sp>
+        <p:nvSpPr>
+          <p:cNvPr id="2" name="Title 1">
+            <a:extLst>
+              <a:ext uri="{FF2B5EF4-FFF2-40B4-BE49-F238E27FC236}">
+                <a16:creationId xmlns:a16="http://schemas.microsoft.com/office/drawing/2014/main" id="{5A0DC5C4-5BF0-1771-6E64-CE50F1A41C8A}"/>
+              </a:ext>
+            </a:extLst>
+          </p:cNvPr>
+          <p:cNvSpPr>
+            <a:spLocks noGrp="1"/>
+          </p:cNvSpPr>
+          <p:nvPr>
+            <p:ph type="title"/>
+          </p:nvPr>
+        </p:nvSpPr>
+        <p:spPr/>
+        <p:txBody>
+          <a:bodyPr/>
+          <a:lstStyle/>
+          <a:p>
+            <a:r>
+              <a:rPr lang="en-US" b="1" dirty="0">
+                <a:solidFill>
+                  <a:schemeClr val="accent1">
+                    <a:lumMod val="75000"/>
+                  </a:schemeClr>
+                </a:solidFill>
+              </a:rPr>
+              <a:t>Exercise 7: Taylor Swift Songs</a:t>
+            </a:r>
+            <a:r>
+              <a:rPr lang="en-US" dirty="0"/>
+              <a:t>⭐️ ⭐️ ⭐️</a:t>
+            </a:r>
+          </a:p>
+        </p:txBody>
+      </p:sp>
+      <p:sp>
+        <p:nvSpPr>
+          <p:cNvPr id="3" name="Content Placeholder 2">
+            <a:extLst>
+              <a:ext uri="{FF2B5EF4-FFF2-40B4-BE49-F238E27FC236}">
+                <a16:creationId xmlns:a16="http://schemas.microsoft.com/office/drawing/2014/main" id="{B0F97B5E-1DBA-C20C-66C2-FF0EEA6C8DE0}"/>
+              </a:ext>
+            </a:extLst>
+          </p:cNvPr>
+          <p:cNvSpPr>
+            <a:spLocks noGrp="1"/>
+          </p:cNvSpPr>
+          <p:nvPr>
+            <p:ph idx="1"/>
+          </p:nvPr>
+        </p:nvSpPr>
+        <p:spPr/>
+        <p:txBody>
+          <a:bodyPr>
+            <a:normAutofit/>
+          </a:bodyPr>
+          <a:lstStyle/>
+          <a:p>
+            <a:pPr marL="0" indent="0">
+              <a:buNone/>
+            </a:pPr>
+            <a:r>
+              <a:rPr lang="en-US" dirty="0"/>
+              <a:t>Create a function that output the day of the week in which each of her songs were published.</a:t>
+            </a:r>
+          </a:p>
+          <a:p>
+            <a:pPr marL="0" indent="0">
+              <a:buNone/>
+            </a:pPr>
+            <a:endParaRPr lang="en-US" dirty="0"/>
+          </a:p>
+          <a:p>
+            <a:pPr marL="0" indent="0">
+              <a:buNone/>
+            </a:pPr>
+            <a:r>
+              <a:rPr lang="en-US" dirty="0"/>
+              <a:t>ser = </a:t>
+            </a:r>
+            <a:r>
+              <a:rPr lang="en-US" dirty="0" err="1"/>
+              <a:t>pd.Series</a:t>
+            </a:r>
+            <a:r>
+              <a:rPr lang="en-US" dirty="0"/>
+              <a:t>(['01 Jan 2010', '02-02-2011', '20120303', '2013/04/04', '2014-05-05'])</a:t>
+            </a:r>
+            <a:br>
+              <a:rPr lang="en-US" dirty="0"/>
+            </a:br>
+            <a:endParaRPr lang="en-US" dirty="0"/>
+          </a:p>
+          <a:p>
+            <a:pPr marL="0" indent="0">
+              <a:buNone/>
+            </a:pPr>
+            <a:r>
+              <a:rPr lang="en-US" dirty="0"/>
+              <a:t>Desired output</a:t>
+            </a:r>
+          </a:p>
+          <a:p>
+            <a:pPr marL="0" indent="0">
+              <a:buNone/>
+            </a:pPr>
+            <a:r>
+              <a:rPr lang="en-US" dirty="0"/>
+              <a:t>Day of week:  ['Friday', 'Wednesday', 'Saturday', 'Thursday', 'Monday']</a:t>
+            </a:r>
+          </a:p>
+          <a:p>
+            <a:endParaRPr lang="en-US" dirty="0"/>
+          </a:p>
+        </p:txBody>
+      </p:sp>
+      <p:sp>
+        <p:nvSpPr>
+          <p:cNvPr id="4" name="Slide Number Placeholder 3">
+            <a:extLst>
+              <a:ext uri="{FF2B5EF4-FFF2-40B4-BE49-F238E27FC236}">
+                <a16:creationId xmlns:a16="http://schemas.microsoft.com/office/drawing/2014/main" id="{5069E6F0-D63E-3B8B-A559-19357FDC4823}"/>
+              </a:ext>
+            </a:extLst>
+          </p:cNvPr>
+          <p:cNvSpPr>
+            <a:spLocks noGrp="1"/>
+          </p:cNvSpPr>
+          <p:nvPr>
+            <p:ph type="sldNum" sz="quarter" idx="12"/>
+          </p:nvPr>
+        </p:nvSpPr>
+        <p:spPr/>
+        <p:txBody>
+          <a:bodyPr/>
+          <a:lstStyle/>
+          <a:p>
+            <a:fld id="{491CF4B3-B97C-1B49-985A-93725184CD23}" type="slidenum">
+              <a:rPr lang="en-US" smtClean="0"/>
+              <a:t>19</a:t>
+            </a:fld>
+            <a:endParaRPr lang="en-US"/>
+          </a:p>
+        </p:txBody>
+      </p:sp>
+    </p:spTree>
+    <p:extLst>
+      <p:ext uri="{BB962C8B-B14F-4D97-AF65-F5344CB8AC3E}">
+        <p14:creationId xmlns:p14="http://schemas.microsoft.com/office/powerpoint/2010/main" val="1836167359"/>
+      </p:ext>
+    </p:extLst>
+  </p:cSld>
+  <p:clrMapOvr>
+    <a:masterClrMapping/>
+  </p:clrMapOvr>
+</p:sld>
+</file>
+
 <file path=ppt/slides/slide2.xml><?xml version="1.0" encoding="utf-8"?>
 <p:sld xmlns:a="http://schemas.openxmlformats.org/drawingml/2006/main" xmlns:r="http://schemas.openxmlformats.org/officeDocument/2006/relationships" xmlns:p="http://schemas.openxmlformats.org/presentationml/2006/main">
   <p:cSld>
@@ -4184,6 +6225,590 @@
     <p:extLst>
       <p:ext uri="{BB962C8B-B14F-4D97-AF65-F5344CB8AC3E}">
         <p14:creationId xmlns:p14="http://schemas.microsoft.com/office/powerpoint/2010/main" val="208479163"/>
+      </p:ext>
+    </p:extLst>
+  </p:cSld>
+  <p:clrMapOvr>
+    <a:masterClrMapping/>
+  </p:clrMapOvr>
+</p:sld>
+</file>
+
+<file path=ppt/slides/slide20.xml><?xml version="1.0" encoding="utf-8"?>
+<p:sld xmlns:a="http://schemas.openxmlformats.org/drawingml/2006/main" xmlns:r="http://schemas.openxmlformats.org/officeDocument/2006/relationships" xmlns:p="http://schemas.openxmlformats.org/presentationml/2006/main">
+  <p:cSld>
+    <p:spTree>
+      <p:nvGrpSpPr>
+        <p:cNvPr id="1" name=""/>
+        <p:cNvGrpSpPr/>
+        <p:nvPr/>
+      </p:nvGrpSpPr>
+      <p:grpSpPr>
+        <a:xfrm>
+          <a:off x="0" y="0"/>
+          <a:ext cx="0" cy="0"/>
+          <a:chOff x="0" y="0"/>
+          <a:chExt cx="0" cy="0"/>
+        </a:xfrm>
+      </p:grpSpPr>
+      <p:sp>
+        <p:nvSpPr>
+          <p:cNvPr id="2" name="Title 1">
+            <a:extLst>
+              <a:ext uri="{FF2B5EF4-FFF2-40B4-BE49-F238E27FC236}">
+                <a16:creationId xmlns:a16="http://schemas.microsoft.com/office/drawing/2014/main" id="{C554AC7F-83F8-7014-61D3-A290E4AFB297}"/>
+              </a:ext>
+            </a:extLst>
+          </p:cNvPr>
+          <p:cNvSpPr>
+            <a:spLocks noGrp="1"/>
+          </p:cNvSpPr>
+          <p:nvPr>
+            <p:ph type="title"/>
+          </p:nvPr>
+        </p:nvSpPr>
+        <p:spPr/>
+        <p:txBody>
+          <a:bodyPr/>
+          <a:lstStyle/>
+          <a:p>
+            <a:r>
+              <a:rPr lang="en-US" b="1" dirty="0">
+                <a:solidFill>
+                  <a:schemeClr val="accent1">
+                    <a:lumMod val="75000"/>
+                  </a:schemeClr>
+                </a:solidFill>
+              </a:rPr>
+              <a:t>Exercise 7: Solution</a:t>
+            </a:r>
+            <a:endParaRPr lang="en-US" dirty="0"/>
+          </a:p>
+        </p:txBody>
+      </p:sp>
+      <p:sp>
+        <p:nvSpPr>
+          <p:cNvPr id="3" name="Content Placeholder 2">
+            <a:extLst>
+              <a:ext uri="{FF2B5EF4-FFF2-40B4-BE49-F238E27FC236}">
+                <a16:creationId xmlns:a16="http://schemas.microsoft.com/office/drawing/2014/main" id="{C525A007-A8EE-CD6D-6800-C06E6CB49CB0}"/>
+              </a:ext>
+            </a:extLst>
+          </p:cNvPr>
+          <p:cNvSpPr>
+            <a:spLocks noGrp="1"/>
+          </p:cNvSpPr>
+          <p:nvPr>
+            <p:ph idx="1"/>
+          </p:nvPr>
+        </p:nvSpPr>
+        <p:spPr/>
+        <p:txBody>
+          <a:bodyPr>
+            <a:normAutofit/>
+          </a:bodyPr>
+          <a:lstStyle/>
+          <a:p>
+            <a:pPr marL="0" indent="0">
+              <a:buNone/>
+            </a:pPr>
+            <a:endParaRPr lang="en-US" dirty="0"/>
+          </a:p>
+        </p:txBody>
+      </p:sp>
+      <p:sp>
+        <p:nvSpPr>
+          <p:cNvPr id="4" name="Slide Number Placeholder 3">
+            <a:extLst>
+              <a:ext uri="{FF2B5EF4-FFF2-40B4-BE49-F238E27FC236}">
+                <a16:creationId xmlns:a16="http://schemas.microsoft.com/office/drawing/2014/main" id="{536DC667-8273-C810-1058-FB32AFE64120}"/>
+              </a:ext>
+            </a:extLst>
+          </p:cNvPr>
+          <p:cNvSpPr>
+            <a:spLocks noGrp="1"/>
+          </p:cNvSpPr>
+          <p:nvPr>
+            <p:ph type="sldNum" sz="quarter" idx="12"/>
+          </p:nvPr>
+        </p:nvSpPr>
+        <p:spPr/>
+        <p:txBody>
+          <a:bodyPr/>
+          <a:lstStyle/>
+          <a:p>
+            <a:fld id="{491CF4B3-B97C-1B49-985A-93725184CD23}" type="slidenum">
+              <a:rPr lang="en-US" smtClean="0"/>
+              <a:t>20</a:t>
+            </a:fld>
+            <a:endParaRPr lang="en-US"/>
+          </a:p>
+        </p:txBody>
+      </p:sp>
+    </p:spTree>
+    <p:extLst>
+      <p:ext uri="{BB962C8B-B14F-4D97-AF65-F5344CB8AC3E}">
+        <p14:creationId xmlns:p14="http://schemas.microsoft.com/office/powerpoint/2010/main" val="2114333812"/>
+      </p:ext>
+    </p:extLst>
+  </p:cSld>
+  <p:clrMapOvr>
+    <a:masterClrMapping/>
+  </p:clrMapOvr>
+</p:sld>
+</file>
+
+<file path=ppt/slides/slide21.xml><?xml version="1.0" encoding="utf-8"?>
+<p:sld xmlns:a="http://schemas.openxmlformats.org/drawingml/2006/main" xmlns:r="http://schemas.openxmlformats.org/officeDocument/2006/relationships" xmlns:p="http://schemas.openxmlformats.org/presentationml/2006/main">
+  <p:cSld>
+    <p:spTree>
+      <p:nvGrpSpPr>
+        <p:cNvPr id="1" name=""/>
+        <p:cNvGrpSpPr/>
+        <p:nvPr/>
+      </p:nvGrpSpPr>
+      <p:grpSpPr>
+        <a:xfrm>
+          <a:off x="0" y="0"/>
+          <a:ext cx="0" cy="0"/>
+          <a:chOff x="0" y="0"/>
+          <a:chExt cx="0" cy="0"/>
+        </a:xfrm>
+      </p:grpSpPr>
+      <p:sp>
+        <p:nvSpPr>
+          <p:cNvPr id="2" name="Title 1">
+            <a:extLst>
+              <a:ext uri="{FF2B5EF4-FFF2-40B4-BE49-F238E27FC236}">
+                <a16:creationId xmlns:a16="http://schemas.microsoft.com/office/drawing/2014/main" id="{5A0DC5C4-5BF0-1771-6E64-CE50F1A41C8A}"/>
+              </a:ext>
+            </a:extLst>
+          </p:cNvPr>
+          <p:cNvSpPr>
+            <a:spLocks noGrp="1"/>
+          </p:cNvSpPr>
+          <p:nvPr>
+            <p:ph type="title"/>
+          </p:nvPr>
+        </p:nvSpPr>
+        <p:spPr/>
+        <p:txBody>
+          <a:bodyPr/>
+          <a:lstStyle/>
+          <a:p>
+            <a:r>
+              <a:rPr lang="en-US" b="1" dirty="0">
+                <a:solidFill>
+                  <a:schemeClr val="accent1">
+                    <a:lumMod val="75000"/>
+                  </a:schemeClr>
+                </a:solidFill>
+              </a:rPr>
+              <a:t>Exercise 8: Building a pyramid</a:t>
+            </a:r>
+            <a:r>
+              <a:rPr lang="en-US" dirty="0"/>
+              <a:t>⭐️ ⭐️ ⭐️</a:t>
+            </a:r>
+          </a:p>
+        </p:txBody>
+      </p:sp>
+      <p:sp>
+        <p:nvSpPr>
+          <p:cNvPr id="3" name="Content Placeholder 2">
+            <a:extLst>
+              <a:ext uri="{FF2B5EF4-FFF2-40B4-BE49-F238E27FC236}">
+                <a16:creationId xmlns:a16="http://schemas.microsoft.com/office/drawing/2014/main" id="{B0F97B5E-1DBA-C20C-66C2-FF0EEA6C8DE0}"/>
+              </a:ext>
+            </a:extLst>
+          </p:cNvPr>
+          <p:cNvSpPr>
+            <a:spLocks noGrp="1"/>
+          </p:cNvSpPr>
+          <p:nvPr>
+            <p:ph idx="1"/>
+          </p:nvPr>
+        </p:nvSpPr>
+        <p:spPr/>
+        <p:txBody>
+          <a:bodyPr>
+            <a:normAutofit fontScale="92500" lnSpcReduction="10000"/>
+          </a:bodyPr>
+          <a:lstStyle/>
+          <a:p>
+            <a:pPr marL="0" indent="0">
+              <a:buNone/>
+            </a:pPr>
+            <a:r>
+              <a:rPr lang="en-GB" dirty="0">
+                <a:effectLst/>
+                <a:latin typeface="Menlo" panose="020B0609030804020204" pitchFamily="49" charset="0"/>
+              </a:rPr>
+              <a:t>Write a function that prints a pyramid-like pattern with numbers starting from 1 and increasing by one each time you go down the pyramid.</a:t>
+            </a:r>
+          </a:p>
+          <a:p>
+            <a:pPr marL="0" indent="0">
+              <a:buNone/>
+            </a:pPr>
+            <a:endParaRPr lang="en-GB" dirty="0">
+              <a:effectLst/>
+              <a:latin typeface="Menlo" panose="020B0609030804020204" pitchFamily="49" charset="0"/>
+            </a:endParaRPr>
+          </a:p>
+          <a:p>
+            <a:pPr marL="0" indent="0">
+              <a:buNone/>
+            </a:pPr>
+            <a:r>
+              <a:rPr lang="en-GB" dirty="0">
+                <a:effectLst/>
+                <a:latin typeface="Menlo" panose="020B0609030804020204" pitchFamily="49" charset="0"/>
+              </a:rPr>
+              <a:t>Desired output</a:t>
+            </a:r>
+            <a:br>
+              <a:rPr lang="en-GB" dirty="0">
+                <a:effectLst/>
+                <a:latin typeface="Menlo" panose="020B0609030804020204" pitchFamily="49" charset="0"/>
+              </a:rPr>
+            </a:br>
+            <a:endParaRPr lang="en-GB" dirty="0">
+              <a:effectLst/>
+              <a:latin typeface="Menlo" panose="020B0609030804020204" pitchFamily="49" charset="0"/>
+            </a:endParaRPr>
+          </a:p>
+          <a:p>
+            <a:pPr marL="0" indent="0">
+              <a:buNone/>
+            </a:pPr>
+            <a:r>
+              <a:rPr lang="en-GB" dirty="0">
+                <a:effectLst/>
+                <a:latin typeface="Menlo" panose="020B0609030804020204" pitchFamily="49" charset="0"/>
+              </a:rPr>
+              <a:t>   1</a:t>
+            </a:r>
+          </a:p>
+          <a:p>
+            <a:pPr marL="0" indent="0">
+              <a:buNone/>
+            </a:pPr>
+            <a:r>
+              <a:rPr lang="en-GB" dirty="0">
+                <a:effectLst/>
+                <a:latin typeface="Menlo" panose="020B0609030804020204" pitchFamily="49" charset="0"/>
+              </a:rPr>
+              <a:t>  2 2</a:t>
+            </a:r>
+          </a:p>
+          <a:p>
+            <a:pPr marL="0" indent="0">
+              <a:buNone/>
+            </a:pPr>
+            <a:r>
+              <a:rPr lang="en-GB" dirty="0">
+                <a:effectLst/>
+                <a:latin typeface="Menlo" panose="020B0609030804020204" pitchFamily="49" charset="0"/>
+              </a:rPr>
+              <a:t> 3 3 3</a:t>
+            </a:r>
+          </a:p>
+          <a:p>
+            <a:pPr marL="0" indent="0">
+              <a:buNone/>
+            </a:pPr>
+            <a:r>
+              <a:rPr lang="en-GB" dirty="0">
+                <a:effectLst/>
+                <a:latin typeface="Menlo" panose="020B0609030804020204" pitchFamily="49" charset="0"/>
+              </a:rPr>
+              <a:t>4 4 4 4</a:t>
+            </a:r>
+          </a:p>
+          <a:p>
+            <a:endParaRPr lang="en-US" dirty="0"/>
+          </a:p>
+        </p:txBody>
+      </p:sp>
+      <p:sp>
+        <p:nvSpPr>
+          <p:cNvPr id="4" name="Slide Number Placeholder 3">
+            <a:extLst>
+              <a:ext uri="{FF2B5EF4-FFF2-40B4-BE49-F238E27FC236}">
+                <a16:creationId xmlns:a16="http://schemas.microsoft.com/office/drawing/2014/main" id="{5069E6F0-D63E-3B8B-A559-19357FDC4823}"/>
+              </a:ext>
+            </a:extLst>
+          </p:cNvPr>
+          <p:cNvSpPr>
+            <a:spLocks noGrp="1"/>
+          </p:cNvSpPr>
+          <p:nvPr>
+            <p:ph type="sldNum" sz="quarter" idx="12"/>
+          </p:nvPr>
+        </p:nvSpPr>
+        <p:spPr/>
+        <p:txBody>
+          <a:bodyPr/>
+          <a:lstStyle/>
+          <a:p>
+            <a:fld id="{491CF4B3-B97C-1B49-985A-93725184CD23}" type="slidenum">
+              <a:rPr lang="en-US" smtClean="0"/>
+              <a:t>21</a:t>
+            </a:fld>
+            <a:endParaRPr lang="en-US"/>
+          </a:p>
+        </p:txBody>
+      </p:sp>
+    </p:spTree>
+    <p:extLst>
+      <p:ext uri="{BB962C8B-B14F-4D97-AF65-F5344CB8AC3E}">
+        <p14:creationId xmlns:p14="http://schemas.microsoft.com/office/powerpoint/2010/main" val="3608568842"/>
+      </p:ext>
+    </p:extLst>
+  </p:cSld>
+  <p:clrMapOvr>
+    <a:masterClrMapping/>
+  </p:clrMapOvr>
+</p:sld>
+</file>
+
+<file path=ppt/slides/slide22.xml><?xml version="1.0" encoding="utf-8"?>
+<p:sld xmlns:a="http://schemas.openxmlformats.org/drawingml/2006/main" xmlns:r="http://schemas.openxmlformats.org/officeDocument/2006/relationships" xmlns:p="http://schemas.openxmlformats.org/presentationml/2006/main">
+  <p:cSld>
+    <p:spTree>
+      <p:nvGrpSpPr>
+        <p:cNvPr id="1" name=""/>
+        <p:cNvGrpSpPr/>
+        <p:nvPr/>
+      </p:nvGrpSpPr>
+      <p:grpSpPr>
+        <a:xfrm>
+          <a:off x="0" y="0"/>
+          <a:ext cx="0" cy="0"/>
+          <a:chOff x="0" y="0"/>
+          <a:chExt cx="0" cy="0"/>
+        </a:xfrm>
+      </p:grpSpPr>
+      <p:sp>
+        <p:nvSpPr>
+          <p:cNvPr id="2" name="Title 1">
+            <a:extLst>
+              <a:ext uri="{FF2B5EF4-FFF2-40B4-BE49-F238E27FC236}">
+                <a16:creationId xmlns:a16="http://schemas.microsoft.com/office/drawing/2014/main" id="{C554AC7F-83F8-7014-61D3-A290E4AFB297}"/>
+              </a:ext>
+            </a:extLst>
+          </p:cNvPr>
+          <p:cNvSpPr>
+            <a:spLocks noGrp="1"/>
+          </p:cNvSpPr>
+          <p:nvPr>
+            <p:ph type="title"/>
+          </p:nvPr>
+        </p:nvSpPr>
+        <p:spPr/>
+        <p:txBody>
+          <a:bodyPr/>
+          <a:lstStyle/>
+          <a:p>
+            <a:r>
+              <a:rPr lang="en-US" b="1" dirty="0">
+                <a:solidFill>
+                  <a:schemeClr val="accent1">
+                    <a:lumMod val="75000"/>
+                  </a:schemeClr>
+                </a:solidFill>
+              </a:rPr>
+              <a:t>Exercise 8: Solution</a:t>
+            </a:r>
+            <a:endParaRPr lang="en-US" dirty="0"/>
+          </a:p>
+        </p:txBody>
+      </p:sp>
+      <p:sp>
+        <p:nvSpPr>
+          <p:cNvPr id="3" name="Content Placeholder 2">
+            <a:extLst>
+              <a:ext uri="{FF2B5EF4-FFF2-40B4-BE49-F238E27FC236}">
+                <a16:creationId xmlns:a16="http://schemas.microsoft.com/office/drawing/2014/main" id="{C525A007-A8EE-CD6D-6800-C06E6CB49CB0}"/>
+              </a:ext>
+            </a:extLst>
+          </p:cNvPr>
+          <p:cNvSpPr>
+            <a:spLocks noGrp="1"/>
+          </p:cNvSpPr>
+          <p:nvPr>
+            <p:ph idx="1"/>
+          </p:nvPr>
+        </p:nvSpPr>
+        <p:spPr/>
+        <p:txBody>
+          <a:bodyPr>
+            <a:normAutofit lnSpcReduction="10000"/>
+          </a:bodyPr>
+          <a:lstStyle/>
+          <a:p>
+            <a:pPr marL="0" indent="0">
+              <a:buNone/>
+            </a:pPr>
+            <a:r>
+              <a:rPr lang="en-US" dirty="0"/>
+              <a:t>def pyramid(</a:t>
+            </a:r>
+            <a:r>
+              <a:rPr lang="en-US" dirty="0" err="1"/>
+              <a:t>range_pyr</a:t>
+            </a:r>
+            <a:r>
+              <a:rPr lang="en-US" dirty="0"/>
+              <a:t>):</a:t>
+            </a:r>
+          </a:p>
+          <a:p>
+            <a:pPr marL="0" indent="0">
+              <a:buNone/>
+            </a:pPr>
+            <a:r>
+              <a:rPr lang="en-US" dirty="0"/>
+              <a:t>    k = </a:t>
+            </a:r>
+            <a:r>
+              <a:rPr lang="en-US" dirty="0" err="1"/>
+              <a:t>range_pyr</a:t>
+            </a:r>
+            <a:r>
+              <a:rPr lang="en-US" dirty="0"/>
+              <a:t> - 1</a:t>
+            </a:r>
+          </a:p>
+          <a:p>
+            <a:pPr marL="0" indent="0">
+              <a:buNone/>
+            </a:pPr>
+            <a:r>
+              <a:rPr lang="en-US" dirty="0"/>
+              <a:t>    for </a:t>
+            </a:r>
+            <a:r>
+              <a:rPr lang="en-US" dirty="0" err="1"/>
+              <a:t>i</a:t>
+            </a:r>
+            <a:r>
+              <a:rPr lang="en-US" dirty="0"/>
+              <a:t> in range(0, </a:t>
+            </a:r>
+            <a:r>
+              <a:rPr lang="en-US" dirty="0" err="1"/>
+              <a:t>range_pyr</a:t>
+            </a:r>
+            <a:r>
+              <a:rPr lang="en-US" dirty="0"/>
+              <a:t>):</a:t>
+            </a:r>
+          </a:p>
+          <a:p>
+            <a:pPr marL="0" indent="0">
+              <a:buNone/>
+            </a:pPr>
+            <a:r>
+              <a:rPr lang="en-US" dirty="0"/>
+              <a:t>        for j in range(0, k):</a:t>
+            </a:r>
+          </a:p>
+          <a:p>
+            <a:pPr marL="0" indent="0">
+              <a:buNone/>
+            </a:pPr>
+            <a:r>
+              <a:rPr lang="en-US" dirty="0"/>
+              <a:t>            print(end=" ")</a:t>
+            </a:r>
+          </a:p>
+          <a:p>
+            <a:pPr marL="0" indent="0">
+              <a:buNone/>
+            </a:pPr>
+            <a:r>
+              <a:rPr lang="en-US" dirty="0"/>
+              <a:t>        k = k - 1</a:t>
+            </a:r>
+          </a:p>
+          <a:p>
+            <a:pPr marL="0" indent="0">
+              <a:buNone/>
+            </a:pPr>
+            <a:r>
+              <a:rPr lang="en-US" dirty="0"/>
+              <a:t>        for j in range(0, i+1):</a:t>
+            </a:r>
+          </a:p>
+          <a:p>
+            <a:pPr marL="0" indent="0">
+              <a:buNone/>
+            </a:pPr>
+            <a:r>
+              <a:rPr lang="en-US" dirty="0"/>
+              <a:t>            print(</a:t>
+            </a:r>
+            <a:r>
+              <a:rPr lang="en-US" dirty="0" err="1"/>
+              <a:t>i</a:t>
+            </a:r>
+            <a:r>
+              <a:rPr lang="en-US" dirty="0"/>
+              <a:t>, end=" ")</a:t>
+            </a:r>
+          </a:p>
+          <a:p>
+            <a:pPr marL="0" indent="0">
+              <a:buNone/>
+            </a:pPr>
+            <a:r>
+              <a:rPr lang="en-US" dirty="0"/>
+              <a:t>        print("\r")</a:t>
+            </a:r>
+          </a:p>
+          <a:p>
+            <a:pPr marL="0" indent="0">
+              <a:buNone/>
+            </a:pPr>
+            <a:endParaRPr lang="en-US" dirty="0"/>
+          </a:p>
+        </p:txBody>
+      </p:sp>
+      <p:sp>
+        <p:nvSpPr>
+          <p:cNvPr id="4" name="Slide Number Placeholder 3">
+            <a:extLst>
+              <a:ext uri="{FF2B5EF4-FFF2-40B4-BE49-F238E27FC236}">
+                <a16:creationId xmlns:a16="http://schemas.microsoft.com/office/drawing/2014/main" id="{536DC667-8273-C810-1058-FB32AFE64120}"/>
+              </a:ext>
+            </a:extLst>
+          </p:cNvPr>
+          <p:cNvSpPr>
+            <a:spLocks noGrp="1"/>
+          </p:cNvSpPr>
+          <p:nvPr>
+            <p:ph type="sldNum" sz="quarter" idx="12"/>
+          </p:nvPr>
+        </p:nvSpPr>
+        <p:spPr/>
+        <p:txBody>
+          <a:bodyPr/>
+          <a:lstStyle/>
+          <a:p>
+            <a:fld id="{491CF4B3-B97C-1B49-985A-93725184CD23}" type="slidenum">
+              <a:rPr lang="en-US" smtClean="0"/>
+              <a:t>22</a:t>
+            </a:fld>
+            <a:endParaRPr lang="en-US"/>
+          </a:p>
+        </p:txBody>
+      </p:sp>
+    </p:spTree>
+    <p:extLst>
+      <p:ext uri="{BB962C8B-B14F-4D97-AF65-F5344CB8AC3E}">
+        <p14:creationId xmlns:p14="http://schemas.microsoft.com/office/powerpoint/2010/main" val="2522321794"/>
       </p:ext>
     </p:extLst>
   </p:cSld>
@@ -5726,7 +8351,15 @@
           <a:p>
             <a:r>
               <a:rPr lang="en-US" dirty="0"/>
-              <a:t>20 minutes per exercise</a:t>
+              <a:t>3</a:t>
+            </a:r>
+            <a:r>
+              <a:rPr lang="en-US"/>
+              <a:t>0 </a:t>
+            </a:r>
+            <a:r>
+              <a:rPr lang="en-US" dirty="0"/>
+              <a:t>minutes per exercise</a:t>
             </a:r>
           </a:p>
           <a:p>
@@ -5893,8 +8526,62 @@
         </p:nvSpPr>
         <p:spPr/>
         <p:txBody>
-          <a:bodyPr/>
-          <a:lstStyle/>
+          <a:bodyPr>
+            <a:normAutofit/>
+          </a:bodyPr>
+          <a:lstStyle/>
+          <a:p>
+            <a:pPr marL="0" indent="0">
+              <a:buNone/>
+            </a:pPr>
+            <a:r>
+              <a:rPr lang="en-US" dirty="0"/>
+              <a:t>Write a function that prints the next 20 leap years starting from 2022.</a:t>
+            </a:r>
+          </a:p>
+          <a:p>
+            <a:pPr marL="0" indent="0">
+              <a:buNone/>
+            </a:pPr>
+            <a:endParaRPr lang="en-US" dirty="0"/>
+          </a:p>
+          <a:p>
+            <a:pPr marL="0" indent="0">
+              <a:buNone/>
+            </a:pPr>
+            <a:r>
+              <a:rPr lang="en-US" dirty="0"/>
+              <a:t>Function Input: 2022</a:t>
+            </a:r>
+          </a:p>
+          <a:p>
+            <a:pPr marL="0" indent="0">
+              <a:buNone/>
+            </a:pPr>
+            <a:endParaRPr lang="en-US" dirty="0"/>
+          </a:p>
+          <a:p>
+            <a:pPr marL="0" indent="0">
+              <a:buNone/>
+            </a:pPr>
+            <a:r>
+              <a:rPr lang="en-US" dirty="0"/>
+              <a:t>Desired output</a:t>
+            </a:r>
+            <a:br>
+              <a:rPr lang="en-US" dirty="0"/>
+            </a:br>
+            <a:endParaRPr lang="en-US" dirty="0"/>
+          </a:p>
+          <a:p>
+            <a:pPr marL="0" indent="0">
+              <a:buNone/>
+            </a:pPr>
+            <a:r>
+              <a:rPr lang="en-US" dirty="0"/>
+              <a:t>2024, 2028, 2032, 2036, 2040, 2044, 2048 ….</a:t>
+            </a:r>
+          </a:p>
           <a:p>
             <a:pPr marL="0" indent="0">
               <a:buNone/>
@@ -5936,6 +8623,401 @@
     <p:extLst>
       <p:ext uri="{BB962C8B-B14F-4D97-AF65-F5344CB8AC3E}">
         <p14:creationId xmlns:p14="http://schemas.microsoft.com/office/powerpoint/2010/main" val="3864283043"/>
+      </p:ext>
+    </p:extLst>
+  </p:cSld>
+  <p:clrMapOvr>
+    <a:masterClrMapping/>
+  </p:clrMapOvr>
+</p:sld>
+</file>
+
+<file path=ppt/slides/slide8.xml><?xml version="1.0" encoding="utf-8"?>
+<p:sld xmlns:a="http://schemas.openxmlformats.org/drawingml/2006/main" xmlns:r="http://schemas.openxmlformats.org/officeDocument/2006/relationships" xmlns:p="http://schemas.openxmlformats.org/presentationml/2006/main">
+  <p:cSld>
+    <p:spTree>
+      <p:nvGrpSpPr>
+        <p:cNvPr id="1" name=""/>
+        <p:cNvGrpSpPr/>
+        <p:nvPr/>
+      </p:nvGrpSpPr>
+      <p:grpSpPr>
+        <a:xfrm>
+          <a:off x="0" y="0"/>
+          <a:ext cx="0" cy="0"/>
+          <a:chOff x="0" y="0"/>
+          <a:chExt cx="0" cy="0"/>
+        </a:xfrm>
+      </p:grpSpPr>
+      <p:sp>
+        <p:nvSpPr>
+          <p:cNvPr id="2" name="Title 1">
+            <a:extLst>
+              <a:ext uri="{FF2B5EF4-FFF2-40B4-BE49-F238E27FC236}">
+                <a16:creationId xmlns:a16="http://schemas.microsoft.com/office/drawing/2014/main" id="{C554AC7F-83F8-7014-61D3-A290E4AFB297}"/>
+              </a:ext>
+            </a:extLst>
+          </p:cNvPr>
+          <p:cNvSpPr>
+            <a:spLocks noGrp="1"/>
+          </p:cNvSpPr>
+          <p:nvPr>
+            <p:ph type="title"/>
+          </p:nvPr>
+        </p:nvSpPr>
+        <p:spPr/>
+        <p:txBody>
+          <a:bodyPr/>
+          <a:lstStyle/>
+          <a:p>
+            <a:r>
+              <a:rPr lang="en-US" b="1" dirty="0">
+                <a:solidFill>
+                  <a:schemeClr val="accent1">
+                    <a:lumMod val="75000"/>
+                  </a:schemeClr>
+                </a:solidFill>
+              </a:rPr>
+              <a:t>Exercise 1: Solution</a:t>
+            </a:r>
+            <a:endParaRPr lang="en-US" dirty="0"/>
+          </a:p>
+        </p:txBody>
+      </p:sp>
+      <p:sp>
+        <p:nvSpPr>
+          <p:cNvPr id="3" name="Content Placeholder 2">
+            <a:extLst>
+              <a:ext uri="{FF2B5EF4-FFF2-40B4-BE49-F238E27FC236}">
+                <a16:creationId xmlns:a16="http://schemas.microsoft.com/office/drawing/2014/main" id="{C525A007-A8EE-CD6D-6800-C06E6CB49CB0}"/>
+              </a:ext>
+            </a:extLst>
+          </p:cNvPr>
+          <p:cNvSpPr>
+            <a:spLocks noGrp="1"/>
+          </p:cNvSpPr>
+          <p:nvPr>
+            <p:ph idx="1"/>
+          </p:nvPr>
+        </p:nvSpPr>
+        <p:spPr/>
+        <p:txBody>
+          <a:bodyPr>
+            <a:normAutofit/>
+          </a:bodyPr>
+          <a:lstStyle/>
+          <a:p>
+            <a:pPr marL="0" indent="0">
+              <a:buNone/>
+            </a:pPr>
+            <a:endParaRPr lang="en-US" dirty="0"/>
+          </a:p>
+          <a:p>
+            <a:pPr marL="0" indent="0">
+              <a:buNone/>
+            </a:pPr>
+            <a:endParaRPr lang="en-US" dirty="0"/>
+          </a:p>
+          <a:p>
+            <a:pPr marL="0" indent="0">
+              <a:buNone/>
+            </a:pPr>
+            <a:r>
+              <a:rPr lang="en-US" dirty="0"/>
+              <a:t>def main(</a:t>
+            </a:r>
+            <a:r>
+              <a:rPr lang="en-US" dirty="0" err="1"/>
+              <a:t>year_start</a:t>
+            </a:r>
+            <a:r>
+              <a:rPr lang="en-US" dirty="0"/>
+              <a:t>, tot):</a:t>
+            </a:r>
+          </a:p>
+          <a:p>
+            <a:pPr marL="0" indent="0">
+              <a:buNone/>
+            </a:pPr>
+            <a:r>
+              <a:rPr lang="en-US" dirty="0"/>
+              <a:t>    for year in range(</a:t>
+            </a:r>
+            <a:r>
+              <a:rPr lang="en-US" dirty="0" err="1"/>
+              <a:t>year_start</a:t>
+            </a:r>
+            <a:r>
+              <a:rPr lang="en-US" dirty="0"/>
+              <a:t>, tot):</a:t>
+            </a:r>
+          </a:p>
+          <a:p>
+            <a:pPr marL="0" indent="0">
+              <a:buNone/>
+            </a:pPr>
+            <a:r>
+              <a:rPr lang="en-US" dirty="0"/>
+              <a:t>        if year % 4 == 0 and (year % 100 != 0 or year % 400 == 0):</a:t>
+            </a:r>
+          </a:p>
+          <a:p>
+            <a:pPr marL="0" indent="0">
+              <a:buNone/>
+            </a:pPr>
+            <a:r>
+              <a:rPr lang="en-US" dirty="0"/>
+              <a:t>            print(year)</a:t>
+            </a:r>
+          </a:p>
+          <a:p>
+            <a:pPr marL="0" indent="0">
+              <a:buNone/>
+            </a:pPr>
+            <a:endParaRPr lang="en-US" dirty="0"/>
+          </a:p>
+        </p:txBody>
+      </p:sp>
+      <p:sp>
+        <p:nvSpPr>
+          <p:cNvPr id="4" name="Slide Number Placeholder 3">
+            <a:extLst>
+              <a:ext uri="{FF2B5EF4-FFF2-40B4-BE49-F238E27FC236}">
+                <a16:creationId xmlns:a16="http://schemas.microsoft.com/office/drawing/2014/main" id="{536DC667-8273-C810-1058-FB32AFE64120}"/>
+              </a:ext>
+            </a:extLst>
+          </p:cNvPr>
+          <p:cNvSpPr>
+            <a:spLocks noGrp="1"/>
+          </p:cNvSpPr>
+          <p:nvPr>
+            <p:ph type="sldNum" sz="quarter" idx="12"/>
+          </p:nvPr>
+        </p:nvSpPr>
+        <p:spPr/>
+        <p:txBody>
+          <a:bodyPr/>
+          <a:lstStyle/>
+          <a:p>
+            <a:fld id="{491CF4B3-B97C-1B49-985A-93725184CD23}" type="slidenum">
+              <a:rPr lang="en-US" smtClean="0"/>
+              <a:t>8</a:t>
+            </a:fld>
+            <a:endParaRPr lang="en-US"/>
+          </a:p>
+        </p:txBody>
+      </p:sp>
+    </p:spTree>
+    <p:extLst>
+      <p:ext uri="{BB962C8B-B14F-4D97-AF65-F5344CB8AC3E}">
+        <p14:creationId xmlns:p14="http://schemas.microsoft.com/office/powerpoint/2010/main" val="3658512160"/>
+      </p:ext>
+    </p:extLst>
+  </p:cSld>
+  <p:clrMapOvr>
+    <a:masterClrMapping/>
+  </p:clrMapOvr>
+</p:sld>
+</file>
+
+<file path=ppt/slides/slide9.xml><?xml version="1.0" encoding="utf-8"?>
+<p:sld xmlns:a="http://schemas.openxmlformats.org/drawingml/2006/main" xmlns:r="http://schemas.openxmlformats.org/officeDocument/2006/relationships" xmlns:p="http://schemas.openxmlformats.org/presentationml/2006/main">
+  <p:cSld>
+    <p:spTree>
+      <p:nvGrpSpPr>
+        <p:cNvPr id="1" name=""/>
+        <p:cNvGrpSpPr/>
+        <p:nvPr/>
+      </p:nvGrpSpPr>
+      <p:grpSpPr>
+        <a:xfrm>
+          <a:off x="0" y="0"/>
+          <a:ext cx="0" cy="0"/>
+          <a:chOff x="0" y="0"/>
+          <a:chExt cx="0" cy="0"/>
+        </a:xfrm>
+      </p:grpSpPr>
+      <p:sp>
+        <p:nvSpPr>
+          <p:cNvPr id="2" name="Title 1">
+            <a:extLst>
+              <a:ext uri="{FF2B5EF4-FFF2-40B4-BE49-F238E27FC236}">
+                <a16:creationId xmlns:a16="http://schemas.microsoft.com/office/drawing/2014/main" id="{77F1C72F-3D40-8EAD-F261-CFAB0E5611C1}"/>
+              </a:ext>
+            </a:extLst>
+          </p:cNvPr>
+          <p:cNvSpPr>
+            <a:spLocks noGrp="1"/>
+          </p:cNvSpPr>
+          <p:nvPr>
+            <p:ph type="title"/>
+          </p:nvPr>
+        </p:nvSpPr>
+        <p:spPr/>
+        <p:txBody>
+          <a:bodyPr/>
+          <a:lstStyle/>
+          <a:p>
+            <a:r>
+              <a:rPr lang="en-US" b="1" dirty="0">
+                <a:solidFill>
+                  <a:schemeClr val="accent1">
+                    <a:lumMod val="75000"/>
+                  </a:schemeClr>
+                </a:solidFill>
+              </a:rPr>
+              <a:t>Exercise 2: Taylor Swift Songs</a:t>
+            </a:r>
+            <a:r>
+              <a:rPr lang="en-US" dirty="0"/>
+              <a:t>⭐️</a:t>
+            </a:r>
+          </a:p>
+        </p:txBody>
+      </p:sp>
+      <p:sp>
+        <p:nvSpPr>
+          <p:cNvPr id="3" name="Content Placeholder 2">
+            <a:extLst>
+              <a:ext uri="{FF2B5EF4-FFF2-40B4-BE49-F238E27FC236}">
+                <a16:creationId xmlns:a16="http://schemas.microsoft.com/office/drawing/2014/main" id="{DD5FB579-A0E3-9131-FDE0-9923615C1FF9}"/>
+              </a:ext>
+            </a:extLst>
+          </p:cNvPr>
+          <p:cNvSpPr>
+            <a:spLocks noGrp="1"/>
+          </p:cNvSpPr>
+          <p:nvPr>
+            <p:ph idx="1"/>
+          </p:nvPr>
+        </p:nvSpPr>
+        <p:spPr/>
+        <p:txBody>
+          <a:bodyPr>
+            <a:normAutofit fontScale="92500" lnSpcReduction="20000"/>
+          </a:bodyPr>
+          <a:lstStyle/>
+          <a:p>
+            <a:pPr marL="0" indent="0">
+              <a:buNone/>
+            </a:pPr>
+            <a:r>
+              <a:rPr lang="en-US" dirty="0"/>
+              <a:t>Write a function that calculates the number of characters in each song written by Taylor Swift. Save these in a different series and print them. Also print the highest number of characters that a song had.</a:t>
+            </a:r>
+          </a:p>
+          <a:p>
+            <a:pPr marL="0" indent="0">
+              <a:buNone/>
+            </a:pPr>
+            <a:endParaRPr lang="en-US" dirty="0"/>
+          </a:p>
+          <a:p>
+            <a:pPr marL="0" indent="0">
+              <a:buNone/>
+            </a:pPr>
+            <a:r>
+              <a:rPr lang="en-US" dirty="0"/>
+              <a:t>Input</a:t>
+            </a:r>
+          </a:p>
+          <a:p>
+            <a:pPr marL="0" indent="0">
+              <a:buNone/>
+            </a:pPr>
+            <a:r>
+              <a:rPr lang="en-US" dirty="0"/>
+              <a:t>ser = </a:t>
+            </a:r>
+            <a:r>
+              <a:rPr lang="en-US" dirty="0" err="1"/>
+              <a:t>pd.Series</a:t>
+            </a:r>
+            <a:r>
+              <a:rPr lang="en-US" dirty="0"/>
+              <a:t>(['Clean', 'All Too Well', 'Lover', 'Ivy'])</a:t>
+            </a:r>
+          </a:p>
+          <a:p>
+            <a:pPr marL="0" indent="0">
+              <a:buNone/>
+            </a:pPr>
+            <a:br>
+              <a:rPr lang="en-US" dirty="0"/>
+            </a:br>
+            <a:endParaRPr lang="en-US" dirty="0"/>
+          </a:p>
+          <a:p>
+            <a:pPr marL="0" indent="0">
+              <a:buNone/>
+            </a:pPr>
+            <a:r>
+              <a:rPr lang="en-US" dirty="0"/>
+              <a:t>Desired output</a:t>
+            </a:r>
+          </a:p>
+          <a:p>
+            <a:pPr marL="0" indent="0">
+              <a:buNone/>
+            </a:pPr>
+            <a:r>
+              <a:rPr lang="en-US" dirty="0"/>
+              <a:t>5, 12, 5, 3</a:t>
+            </a:r>
+          </a:p>
+          <a:p>
+            <a:pPr marL="0" indent="0">
+              <a:buNone/>
+            </a:pPr>
+            <a:r>
+              <a:rPr lang="en-US" dirty="0"/>
+              <a:t>12</a:t>
+            </a:r>
+          </a:p>
+          <a:p>
+            <a:pPr marL="0" indent="0">
+              <a:buNone/>
+            </a:pPr>
+            <a:endParaRPr lang="en-US" dirty="0"/>
+          </a:p>
+          <a:p>
+            <a:endParaRPr lang="en-US" dirty="0"/>
+          </a:p>
+        </p:txBody>
+      </p:sp>
+      <p:sp>
+        <p:nvSpPr>
+          <p:cNvPr id="4" name="Slide Number Placeholder 3">
+            <a:extLst>
+              <a:ext uri="{FF2B5EF4-FFF2-40B4-BE49-F238E27FC236}">
+                <a16:creationId xmlns:a16="http://schemas.microsoft.com/office/drawing/2014/main" id="{AE79DCC1-E911-24A4-1197-782092FF1E2E}"/>
+              </a:ext>
+            </a:extLst>
+          </p:cNvPr>
+          <p:cNvSpPr>
+            <a:spLocks noGrp="1"/>
+          </p:cNvSpPr>
+          <p:nvPr>
+            <p:ph type="sldNum" sz="quarter" idx="12"/>
+          </p:nvPr>
+        </p:nvSpPr>
+        <p:spPr/>
+        <p:txBody>
+          <a:bodyPr/>
+          <a:lstStyle/>
+          <a:p>
+            <a:fld id="{491CF4B3-B97C-1B49-985A-93725184CD23}" type="slidenum">
+              <a:rPr lang="en-US" smtClean="0"/>
+              <a:t>9</a:t>
+            </a:fld>
+            <a:endParaRPr lang="en-US"/>
+          </a:p>
+        </p:txBody>
+      </p:sp>
+    </p:spTree>
+    <p:extLst>
+      <p:ext uri="{BB962C8B-B14F-4D97-AF65-F5344CB8AC3E}">
+        <p14:creationId xmlns:p14="http://schemas.microsoft.com/office/powerpoint/2010/main" val="3943293024"/>
       </p:ext>
     </p:extLst>
   </p:cSld>

</xml_diff>